<commit_message>
NodeJS and AngJS directives
</commit_message>
<xml_diff>
--- a/NodeJS.pptx
+++ b/NodeJS.pptx
@@ -23,7 +23,8 @@
     <p:sldId id="272" r:id="rId17"/>
     <p:sldId id="270" r:id="rId18"/>
     <p:sldId id="268" r:id="rId19"/>
-    <p:sldId id="269" r:id="rId20"/>
+    <p:sldId id="276" r:id="rId20"/>
+    <p:sldId id="269" r:id="rId21"/>
   </p:sldIdLst>
   <p:sldSz cx="9144000" cy="6858000" type="screen4x3"/>
   <p:notesSz cx="6858000" cy="9144000"/>
@@ -313,7 +314,7 @@
           <a:p>
             <a:fld id="{8F235549-BF0A-4B98-8561-3786244E808C}" type="datetimeFigureOut">
               <a:rPr lang="en-US" smtClean="0"/>
-              <a:t>3/1/2016</a:t>
+              <a:t>3/4/2016</a:t>
             </a:fld>
             <a:endParaRPr lang="en-US"/>
           </a:p>
@@ -513,7 +514,7 @@
           <a:p>
             <a:fld id="{8F235549-BF0A-4B98-8561-3786244E808C}" type="datetimeFigureOut">
               <a:rPr lang="en-US" smtClean="0"/>
-              <a:t>3/1/2016</a:t>
+              <a:t>3/4/2016</a:t>
             </a:fld>
             <a:endParaRPr lang="en-US"/>
           </a:p>
@@ -688,7 +689,7 @@
           <a:p>
             <a:fld id="{8F235549-BF0A-4B98-8561-3786244E808C}" type="datetimeFigureOut">
               <a:rPr lang="en-US" smtClean="0"/>
-              <a:t>3/1/2016</a:t>
+              <a:t>3/4/2016</a:t>
             </a:fld>
             <a:endParaRPr lang="en-US"/>
           </a:p>
@@ -853,7 +854,7 @@
           <a:p>
             <a:fld id="{8F235549-BF0A-4B98-8561-3786244E808C}" type="datetimeFigureOut">
               <a:rPr lang="en-US" smtClean="0"/>
-              <a:t>3/1/2016</a:t>
+              <a:t>3/4/2016</a:t>
             </a:fld>
             <a:endParaRPr lang="en-US"/>
           </a:p>
@@ -1101,7 +1102,7 @@
           <a:p>
             <a:fld id="{8F235549-BF0A-4B98-8561-3786244E808C}" type="datetimeFigureOut">
               <a:rPr lang="en-US" smtClean="0"/>
-              <a:t>3/1/2016</a:t>
+              <a:t>3/4/2016</a:t>
             </a:fld>
             <a:endParaRPr lang="en-US"/>
           </a:p>
@@ -1419,7 +1420,7 @@
           <a:p>
             <a:fld id="{8F235549-BF0A-4B98-8561-3786244E808C}" type="datetimeFigureOut">
               <a:rPr lang="en-US" smtClean="0"/>
-              <a:t>3/1/2016</a:t>
+              <a:t>3/4/2016</a:t>
             </a:fld>
             <a:endParaRPr lang="en-US"/>
           </a:p>
@@ -1885,7 +1886,7 @@
           <a:p>
             <a:fld id="{8F235549-BF0A-4B98-8561-3786244E808C}" type="datetimeFigureOut">
               <a:rPr lang="en-US" smtClean="0"/>
-              <a:t>3/1/2016</a:t>
+              <a:t>3/4/2016</a:t>
             </a:fld>
             <a:endParaRPr lang="en-US"/>
           </a:p>
@@ -2033,7 +2034,7 @@
           <a:p>
             <a:fld id="{8F235549-BF0A-4B98-8561-3786244E808C}" type="datetimeFigureOut">
               <a:rPr lang="en-US" smtClean="0"/>
-              <a:t>3/1/2016</a:t>
+              <a:t>3/4/2016</a:t>
             </a:fld>
             <a:endParaRPr lang="en-US"/>
           </a:p>
@@ -2123,7 +2124,7 @@
           <a:p>
             <a:fld id="{8F235549-BF0A-4B98-8561-3786244E808C}" type="datetimeFigureOut">
               <a:rPr lang="en-US" smtClean="0"/>
-              <a:t>3/1/2016</a:t>
+              <a:t>3/4/2016</a:t>
             </a:fld>
             <a:endParaRPr lang="en-US"/>
           </a:p>
@@ -2397,7 +2398,7 @@
           <a:p>
             <a:fld id="{8F235549-BF0A-4B98-8561-3786244E808C}" type="datetimeFigureOut">
               <a:rPr lang="en-US" smtClean="0"/>
-              <a:t>3/1/2016</a:t>
+              <a:t>3/4/2016</a:t>
             </a:fld>
             <a:endParaRPr lang="en-US"/>
           </a:p>
@@ -2702,7 +2703,7 @@
           <a:p>
             <a:fld id="{8F235549-BF0A-4B98-8561-3786244E808C}" type="datetimeFigureOut">
               <a:rPr lang="en-US" smtClean="0"/>
-              <a:t>3/1/2016</a:t>
+              <a:t>3/4/2016</a:t>
             </a:fld>
             <a:endParaRPr lang="en-US"/>
           </a:p>
@@ -3000,7 +3001,7 @@
           <a:p>
             <a:fld id="{8F235549-BF0A-4B98-8561-3786244E808C}" type="datetimeFigureOut">
               <a:rPr lang="en-US" smtClean="0"/>
-              <a:t>3/1/2016</a:t>
+              <a:t>3/4/2016</a:t>
             </a:fld>
             <a:endParaRPr lang="en-US"/>
           </a:p>
@@ -3889,23 +3890,7 @@
             </a:r>
             <a:r>
               <a:rPr lang="en-US" sz="1200" dirty="0"/>
-              <a:t> events </a:t>
-            </a:r>
-            <a:r>
-              <a:rPr lang="en-US" sz="1200" dirty="0"/>
-              <a:t>=</a:t>
-            </a:r>
-            <a:r>
-              <a:rPr lang="en-US" sz="1200" dirty="0"/>
-              <a:t> </a:t>
-            </a:r>
-            <a:r>
-              <a:rPr lang="en-US" sz="1200" dirty="0"/>
-              <a:t>require('events');</a:t>
-            </a:r>
-            <a:r>
-              <a:rPr lang="en-US" sz="1200" dirty="0"/>
-              <a:t> </a:t>
+              <a:t> events = require('events'); </a:t>
             </a:r>
             <a:endParaRPr lang="en-US" sz="1200" dirty="0" smtClean="0"/>
           </a:p>
@@ -3927,39 +3912,15 @@
             </a:r>
             <a:r>
               <a:rPr lang="en-US" sz="1200" dirty="0"/>
-              <a:t> </a:t>
+              <a:t> = new </a:t>
+            </a:r>
+            <a:r>
+              <a:rPr lang="en-US" sz="1200" dirty="0" err="1"/>
+              <a:t>events.EventEmitter</a:t>
             </a:r>
             <a:r>
               <a:rPr lang="en-US" sz="1200" dirty="0"/>
-              <a:t>=</a:t>
-            </a:r>
-            <a:r>
-              <a:rPr lang="en-US" sz="1200" dirty="0"/>
-              <a:t> </a:t>
-            </a:r>
-            <a:r>
-              <a:rPr lang="en-US" sz="1200" dirty="0"/>
-              <a:t>new</a:t>
-            </a:r>
-            <a:r>
-              <a:rPr lang="en-US" sz="1200" dirty="0"/>
-              <a:t> </a:t>
-            </a:r>
-            <a:r>
-              <a:rPr lang="en-US" sz="1200" dirty="0" err="1"/>
-              <a:t>events</a:t>
-            </a:r>
-            <a:r>
-              <a:rPr lang="en-US" sz="1200" dirty="0" err="1"/>
-              <a:t>.EventEmitter</a:t>
-            </a:r>
-            <a:r>
-              <a:rPr lang="en-US" sz="1200" dirty="0"/>
-              <a:t>();</a:t>
-            </a:r>
-            <a:r>
-              <a:rPr lang="en-US" sz="1200" dirty="0"/>
-              <a:t> </a:t>
+              <a:t>(); </a:t>
             </a:r>
             <a:endParaRPr lang="en-US" sz="1200" dirty="0" smtClean="0"/>
           </a:p>
@@ -3977,63 +3938,7 @@
             </a:r>
             <a:r>
               <a:rPr lang="en-US" sz="1200" dirty="0"/>
-              <a:t>listner1 </a:t>
-            </a:r>
-            <a:r>
-              <a:rPr lang="en-US" sz="1200" dirty="0"/>
-              <a:t>=</a:t>
-            </a:r>
-            <a:r>
-              <a:rPr lang="en-US" sz="1200" dirty="0"/>
-              <a:t> </a:t>
-            </a:r>
-            <a:r>
-              <a:rPr lang="en-US" sz="1200" dirty="0"/>
-              <a:t>function</a:t>
-            </a:r>
-            <a:r>
-              <a:rPr lang="en-US" sz="1200" dirty="0"/>
-              <a:t> listner1</a:t>
-            </a:r>
-            <a:r>
-              <a:rPr lang="en-US" sz="1200" dirty="0"/>
-              <a:t>()</a:t>
-            </a:r>
-            <a:r>
-              <a:rPr lang="en-US" sz="1200" dirty="0"/>
-              <a:t> </a:t>
-            </a:r>
-            <a:r>
-              <a:rPr lang="en-US" sz="1200" dirty="0"/>
-              <a:t>{</a:t>
-            </a:r>
-            <a:r>
-              <a:rPr lang="en-US" sz="1200" dirty="0"/>
-              <a:t> console</a:t>
-            </a:r>
-            <a:r>
-              <a:rPr lang="en-US" sz="1200" dirty="0"/>
-              <a:t>.</a:t>
-            </a:r>
-            <a:r>
-              <a:rPr lang="en-US" sz="1200" dirty="0"/>
-              <a:t>log</a:t>
-            </a:r>
-            <a:r>
-              <a:rPr lang="en-US" sz="1200" dirty="0"/>
-              <a:t>('listner1 executed.');</a:t>
-            </a:r>
-            <a:r>
-              <a:rPr lang="en-US" sz="1200" dirty="0"/>
-              <a:t> </a:t>
-            </a:r>
-            <a:r>
-              <a:rPr lang="en-US" sz="1200" dirty="0"/>
-              <a:t>}</a:t>
-            </a:r>
-            <a:r>
-              <a:rPr lang="en-US" sz="1200" dirty="0"/>
-              <a:t> </a:t>
+              <a:t>listner1 = function listner1() { console.log('listner1 executed.'); } </a:t>
             </a:r>
             <a:br>
               <a:rPr lang="en-US" sz="1200" dirty="0"/>
@@ -4048,63 +3953,7 @@
             </a:r>
             <a:r>
               <a:rPr lang="en-US" sz="1200" dirty="0"/>
-              <a:t>listner2 </a:t>
-            </a:r>
-            <a:r>
-              <a:rPr lang="en-US" sz="1200" dirty="0"/>
-              <a:t>=</a:t>
-            </a:r>
-            <a:r>
-              <a:rPr lang="en-US" sz="1200" dirty="0"/>
-              <a:t> </a:t>
-            </a:r>
-            <a:r>
-              <a:rPr lang="en-US" sz="1200" dirty="0"/>
-              <a:t>function</a:t>
-            </a:r>
-            <a:r>
-              <a:rPr lang="en-US" sz="1200" dirty="0"/>
-              <a:t> listner2</a:t>
-            </a:r>
-            <a:r>
-              <a:rPr lang="en-US" sz="1200" dirty="0"/>
-              <a:t>()</a:t>
-            </a:r>
-            <a:r>
-              <a:rPr lang="en-US" sz="1200" dirty="0"/>
-              <a:t> </a:t>
-            </a:r>
-            <a:r>
-              <a:rPr lang="en-US" sz="1200" dirty="0"/>
-              <a:t>{</a:t>
-            </a:r>
-            <a:r>
-              <a:rPr lang="en-US" sz="1200" dirty="0"/>
-              <a:t> console</a:t>
-            </a:r>
-            <a:r>
-              <a:rPr lang="en-US" sz="1200" dirty="0"/>
-              <a:t>.</a:t>
-            </a:r>
-            <a:r>
-              <a:rPr lang="en-US" sz="1200" dirty="0"/>
-              <a:t>log</a:t>
-            </a:r>
-            <a:r>
-              <a:rPr lang="en-US" sz="1200" dirty="0"/>
-              <a:t>('listner2 executed.');</a:t>
-            </a:r>
-            <a:r>
-              <a:rPr lang="en-US" sz="1200" dirty="0"/>
-              <a:t> </a:t>
-            </a:r>
-            <a:r>
-              <a:rPr lang="en-US" sz="1200" dirty="0"/>
-              <a:t>}</a:t>
-            </a:r>
-            <a:r>
-              <a:rPr lang="en-US" sz="1200" dirty="0"/>
-              <a:t> </a:t>
+              <a:t>listner2 = function listner2() { console.log('listner2 executed.'); } </a:t>
             </a:r>
             <a:endParaRPr lang="en-US" sz="1200" dirty="0" smtClean="0"/>
           </a:p>
@@ -4118,31 +3967,11 @@
             </a:r>
             <a:r>
               <a:rPr lang="en-US" sz="1200" dirty="0" err="1"/>
-              <a:t>eventEmitter</a:t>
-            </a:r>
-            <a:r>
-              <a:rPr lang="en-US" sz="1200" dirty="0" err="1"/>
-              <a:t>.</a:t>
-            </a:r>
-            <a:r>
-              <a:rPr lang="en-US" sz="1200" dirty="0" err="1"/>
-              <a:t>addListener</a:t>
+              <a:t>eventEmitter.addListener</a:t>
             </a:r>
             <a:r>
               <a:rPr lang="en-US" sz="1200" dirty="0"/>
-              <a:t>('connection',</a:t>
-            </a:r>
-            <a:r>
-              <a:rPr lang="en-US" sz="1200" dirty="0"/>
-              <a:t> listner1</a:t>
-            </a:r>
-            <a:r>
-              <a:rPr lang="en-US" sz="1200" dirty="0"/>
-              <a:t>);</a:t>
-            </a:r>
-            <a:r>
-              <a:rPr lang="en-US" sz="1200" dirty="0"/>
-              <a:t> </a:t>
+              <a:t>('connection', listner1); </a:t>
             </a:r>
             <a:endParaRPr lang="en-US" sz="1200" dirty="0" smtClean="0"/>
           </a:p>
@@ -4156,31 +3985,11 @@
             </a:r>
             <a:r>
               <a:rPr lang="en-US" sz="1200" dirty="0" err="1"/>
-              <a:t>eventEmitter</a:t>
-            </a:r>
-            <a:r>
-              <a:rPr lang="en-US" sz="1200" dirty="0" err="1"/>
-              <a:t>.</a:t>
-            </a:r>
-            <a:r>
-              <a:rPr lang="en-US" sz="1200" dirty="0" err="1"/>
-              <a:t>on</a:t>
+              <a:t>eventEmitter.on</a:t>
             </a:r>
             <a:r>
               <a:rPr lang="en-US" sz="1200" dirty="0"/>
-              <a:t>('connection',</a:t>
-            </a:r>
-            <a:r>
-              <a:rPr lang="en-US" sz="1200" dirty="0"/>
-              <a:t> listner2</a:t>
-            </a:r>
-            <a:r>
-              <a:rPr lang="en-US" sz="1200" dirty="0"/>
-              <a:t>);</a:t>
-            </a:r>
-            <a:r>
-              <a:rPr lang="en-US" sz="1200" dirty="0"/>
-              <a:t> </a:t>
+              <a:t>('connection', listner2); </a:t>
             </a:r>
             <a:endParaRPr lang="en-US" sz="1200" dirty="0" smtClean="0"/>
           </a:p>
@@ -4326,7 +4135,6 @@
               <a:rPr lang="en-GB" dirty="0" smtClean="0"/>
               <a:t>Both asynchronous and synchronous versions are available</a:t>
             </a:r>
-            <a:endParaRPr lang="en-GB" dirty="0" smtClean="0"/>
           </a:p>
           <a:p>
             <a:endParaRPr lang="en-US" dirty="0" smtClean="0"/>
@@ -5310,11 +5118,7 @@
           <a:p>
             <a:r>
               <a:rPr lang="en-US" dirty="0" smtClean="0"/>
-              <a:t>npm</a:t>
-            </a:r>
-            <a:r>
-              <a:rPr lang="en-US" dirty="0" smtClean="0"/>
-              <a:t>-shrinkwrap</a:t>
+              <a:t>npm-shrinkwrap</a:t>
             </a:r>
             <a:endParaRPr lang="en-US" dirty="0"/>
           </a:p>
@@ -5424,8 +5228,12 @@
           <a:lstStyle/>
           <a:p>
             <a:r>
+              <a:rPr lang="en-US" dirty="0"/>
+              <a:t>n</a:t>
+            </a:r>
+            <a:r>
               <a:rPr lang="en-US" dirty="0" smtClean="0"/>
-              <a:t>References</a:t>
+              <a:t>pm commands</a:t>
             </a:r>
             <a:endParaRPr lang="en-US" dirty="0"/>
           </a:p>
@@ -5443,69 +5251,84 @@
         </p:nvSpPr>
         <p:spPr/>
         <p:txBody>
-          <a:bodyPr/>
-          <a:lstStyle/>
-          <a:p>
-            <a:r>
-              <a:rPr lang="en-US" dirty="0">
-                <a:hlinkClick r:id="rId2"/>
-              </a:rPr>
-              <a:t>https://docs.npmjs.com/cli</a:t>
-            </a:r>
-            <a:r>
-              <a:rPr lang="en-US" dirty="0" smtClean="0">
-                <a:hlinkClick r:id="rId2"/>
-              </a:rPr>
-              <a:t>/</a:t>
-            </a:r>
-            <a:endParaRPr lang="en-US" dirty="0" smtClean="0"/>
-          </a:p>
-          <a:p>
-            <a:r>
-              <a:rPr lang="en-US" dirty="0">
-                <a:hlinkClick r:id="rId3"/>
-              </a:rPr>
-              <a:t>https://</a:t>
-            </a:r>
-            <a:r>
-              <a:rPr lang="en-US" dirty="0" smtClean="0">
-                <a:hlinkClick r:id="rId3"/>
-              </a:rPr>
-              <a:t>nodejs.org/api/documentation.html</a:t>
-            </a:r>
-            <a:endParaRPr lang="en-US" dirty="0" smtClean="0"/>
-          </a:p>
-          <a:p>
-            <a:r>
-              <a:rPr lang="en-US" dirty="0">
-                <a:hlinkClick r:id="rId4"/>
-              </a:rPr>
-              <a:t>http://www.tutorialspoint.com/nodejs</a:t>
-            </a:r>
-            <a:r>
-              <a:rPr lang="en-US" dirty="0" smtClean="0">
-                <a:hlinkClick r:id="rId4"/>
-              </a:rPr>
-              <a:t>/</a:t>
-            </a:r>
-            <a:endParaRPr lang="en-US" dirty="0" smtClean="0"/>
-          </a:p>
-          <a:p>
-            <a:r>
-              <a:rPr lang="en-US" dirty="0"/>
-              <a:t>https://en.wikipedia.org/wiki/POSIX</a:t>
-            </a:r>
-            <a:endParaRPr lang="en-US" dirty="0" smtClean="0"/>
-          </a:p>
-          <a:p>
-            <a:endParaRPr lang="en-US" dirty="0" smtClean="0"/>
+          <a:bodyPr>
+            <a:normAutofit/>
+          </a:bodyPr>
+          <a:lstStyle/>
+          <a:p>
+            <a:r>
+              <a:rPr lang="en-GB" sz="1600" dirty="0"/>
+              <a:t>Use npm-check-updates or npm outdated to suggest the latest </a:t>
+            </a:r>
+            <a:r>
+              <a:rPr lang="en-GB" sz="1600" dirty="0" smtClean="0"/>
+              <a:t>versions</a:t>
+            </a:r>
+          </a:p>
+          <a:p>
+            <a:pPr lvl="1"/>
+            <a:r>
+              <a:rPr lang="en-US" sz="1200" dirty="0"/>
+              <a:t>$ npm install -g npm-check-updates </a:t>
+            </a:r>
+            <a:endParaRPr lang="en-US" sz="1200" dirty="0" smtClean="0"/>
+          </a:p>
+          <a:p>
+            <a:pPr lvl="1"/>
+            <a:r>
+              <a:rPr lang="en-US" sz="1200" dirty="0" smtClean="0"/>
+              <a:t>$ npm-check-updates</a:t>
+            </a:r>
+          </a:p>
+          <a:p>
+            <a:r>
+              <a:rPr lang="en-GB" sz="1600" dirty="0"/>
+              <a:t>Update package.json with new versions if you agree</a:t>
+            </a:r>
+          </a:p>
+          <a:p>
+            <a:pPr lvl="1"/>
+            <a:r>
+              <a:rPr lang="en-US" sz="1200" dirty="0"/>
+              <a:t>npm-check-updates </a:t>
+            </a:r>
+            <a:r>
+              <a:rPr lang="en-US" sz="1200" dirty="0" smtClean="0"/>
+              <a:t>–u</a:t>
+            </a:r>
+          </a:p>
+          <a:p>
+            <a:r>
+              <a:rPr lang="en-GB" sz="1600" dirty="0"/>
+              <a:t>Then do a clean install (w/o the rm I got some dependency warnings)</a:t>
+            </a:r>
+          </a:p>
+          <a:p>
+            <a:pPr lvl="1"/>
+            <a:r>
+              <a:rPr lang="en-US" sz="1200" dirty="0"/>
+              <a:t>$ rm -rf node_modules </a:t>
+            </a:r>
+            <a:endParaRPr lang="en-US" sz="1200" dirty="0" smtClean="0"/>
+          </a:p>
+          <a:p>
+            <a:pPr lvl="1"/>
+            <a:r>
+              <a:rPr lang="en-US" sz="1200" dirty="0" smtClean="0"/>
+              <a:t>$ </a:t>
+            </a:r>
+            <a:r>
+              <a:rPr lang="en-US" sz="1200" dirty="0"/>
+              <a:t>npm install </a:t>
+            </a:r>
+            <a:endParaRPr lang="en-GB" sz="1200" dirty="0"/>
           </a:p>
         </p:txBody>
       </p:sp>
     </p:spTree>
     <p:extLst>
       <p:ext uri="{BB962C8B-B14F-4D97-AF65-F5344CB8AC3E}">
-        <p14:creationId xmlns:p14="http://schemas.microsoft.com/office/powerpoint/2010/main" val="924403351"/>
+        <p14:creationId xmlns:p14="http://schemas.microsoft.com/office/powerpoint/2010/main" val="1103897029"/>
       </p:ext>
     </p:extLst>
   </p:cSld>
@@ -5623,6 +5446,137 @@
     <p:extLst>
       <p:ext uri="{BB962C8B-B14F-4D97-AF65-F5344CB8AC3E}">
         <p14:creationId xmlns:p14="http://schemas.microsoft.com/office/powerpoint/2010/main" val="3578744401"/>
+      </p:ext>
+    </p:extLst>
+  </p:cSld>
+  <p:clrMapOvr>
+    <a:masterClrMapping/>
+  </p:clrMapOvr>
+  <p:timing>
+    <p:tnLst>
+      <p:par>
+        <p:cTn id="1" dur="indefinite" restart="never" nodeType="tmRoot"/>
+      </p:par>
+    </p:tnLst>
+  </p:timing>
+</p:sld>
+</file>
+
+<file path=ppt/slides/slide20.xml><?xml version="1.0" encoding="utf-8"?>
+<p:sld xmlns:a="http://schemas.openxmlformats.org/drawingml/2006/main" xmlns:r="http://schemas.openxmlformats.org/officeDocument/2006/relationships" xmlns:p="http://schemas.openxmlformats.org/presentationml/2006/main">
+  <p:cSld>
+    <p:spTree>
+      <p:nvGrpSpPr>
+        <p:cNvPr id="1" name=""/>
+        <p:cNvGrpSpPr/>
+        <p:nvPr/>
+      </p:nvGrpSpPr>
+      <p:grpSpPr>
+        <a:xfrm>
+          <a:off x="0" y="0"/>
+          <a:ext cx="0" cy="0"/>
+          <a:chOff x="0" y="0"/>
+          <a:chExt cx="0" cy="0"/>
+        </a:xfrm>
+      </p:grpSpPr>
+      <p:sp>
+        <p:nvSpPr>
+          <p:cNvPr id="2" name="Title 1"/>
+          <p:cNvSpPr>
+            <a:spLocks noGrp="1"/>
+          </p:cNvSpPr>
+          <p:nvPr>
+            <p:ph type="title"/>
+          </p:nvPr>
+        </p:nvSpPr>
+        <p:spPr/>
+        <p:txBody>
+          <a:bodyPr/>
+          <a:lstStyle/>
+          <a:p>
+            <a:r>
+              <a:rPr lang="en-US" dirty="0" smtClean="0"/>
+              <a:t>References</a:t>
+            </a:r>
+            <a:endParaRPr lang="en-US" dirty="0"/>
+          </a:p>
+        </p:txBody>
+      </p:sp>
+      <p:sp>
+        <p:nvSpPr>
+          <p:cNvPr id="3" name="Content Placeholder 2"/>
+          <p:cNvSpPr>
+            <a:spLocks noGrp="1"/>
+          </p:cNvSpPr>
+          <p:nvPr>
+            <p:ph idx="1"/>
+          </p:nvPr>
+        </p:nvSpPr>
+        <p:spPr/>
+        <p:txBody>
+          <a:bodyPr/>
+          <a:lstStyle/>
+          <a:p>
+            <a:r>
+              <a:rPr lang="en-US" dirty="0">
+                <a:hlinkClick r:id="rId2"/>
+              </a:rPr>
+              <a:t>https://docs.npmjs.com/cli</a:t>
+            </a:r>
+            <a:r>
+              <a:rPr lang="en-US" dirty="0" smtClean="0">
+                <a:hlinkClick r:id="rId2"/>
+              </a:rPr>
+              <a:t>/</a:t>
+            </a:r>
+            <a:endParaRPr lang="en-US" dirty="0" smtClean="0"/>
+          </a:p>
+          <a:p>
+            <a:r>
+              <a:rPr lang="en-US" dirty="0">
+                <a:hlinkClick r:id="rId3"/>
+              </a:rPr>
+              <a:t>https://</a:t>
+            </a:r>
+            <a:r>
+              <a:rPr lang="en-US" dirty="0" smtClean="0">
+                <a:hlinkClick r:id="rId3"/>
+              </a:rPr>
+              <a:t>nodejs.org/api/documentation.html</a:t>
+            </a:r>
+            <a:endParaRPr lang="en-US" dirty="0" smtClean="0"/>
+          </a:p>
+          <a:p>
+            <a:r>
+              <a:rPr lang="en-US" dirty="0">
+                <a:hlinkClick r:id="rId4"/>
+              </a:rPr>
+              <a:t>http://www.tutorialspoint.com/nodejs</a:t>
+            </a:r>
+            <a:r>
+              <a:rPr lang="en-US" dirty="0" smtClean="0">
+                <a:hlinkClick r:id="rId4"/>
+              </a:rPr>
+              <a:t>/</a:t>
+            </a:r>
+            <a:endParaRPr lang="en-US" dirty="0" smtClean="0"/>
+          </a:p>
+          <a:p>
+            <a:r>
+              <a:rPr lang="en-US" dirty="0"/>
+              <a:t>https://en.wikipedia.org/wiki/POSIX</a:t>
+            </a:r>
+            <a:endParaRPr lang="en-US" dirty="0" smtClean="0"/>
+          </a:p>
+          <a:p>
+            <a:endParaRPr lang="en-US" dirty="0" smtClean="0"/>
+          </a:p>
+        </p:txBody>
+      </p:sp>
+    </p:spTree>
+    <p:extLst>
+      <p:ext uri="{BB962C8B-B14F-4D97-AF65-F5344CB8AC3E}">
+        <p14:creationId xmlns:p14="http://schemas.microsoft.com/office/powerpoint/2010/main" val="924403351"/>
       </p:ext>
     </p:extLst>
   </p:cSld>
@@ -6334,11 +6288,7 @@
             </a:r>
             <a:r>
               <a:rPr lang="en-GB" dirty="0" smtClean="0"/>
-              <a:t> – to start the </a:t>
-            </a:r>
-            <a:r>
-              <a:rPr lang="en-GB" dirty="0" smtClean="0"/>
-              <a:t>REPL</a:t>
+              <a:t> – to start the REPL</a:t>
             </a:r>
           </a:p>
           <a:p>

</xml_diff>

<commit_message>
NodeJS and AngJS some prac issues
</commit_message>
<xml_diff>
--- a/NodeJS.pptx
+++ b/NodeJS.pptx
@@ -13,18 +13,20 @@
     <p:sldId id="261" r:id="rId7"/>
     <p:sldId id="263" r:id="rId8"/>
     <p:sldId id="264" r:id="rId9"/>
-    <p:sldId id="262" r:id="rId10"/>
-    <p:sldId id="265" r:id="rId11"/>
-    <p:sldId id="275" r:id="rId12"/>
-    <p:sldId id="274" r:id="rId13"/>
-    <p:sldId id="267" r:id="rId14"/>
-    <p:sldId id="271" r:id="rId15"/>
-    <p:sldId id="273" r:id="rId16"/>
-    <p:sldId id="272" r:id="rId17"/>
-    <p:sldId id="270" r:id="rId18"/>
-    <p:sldId id="268" r:id="rId19"/>
-    <p:sldId id="276" r:id="rId20"/>
-    <p:sldId id="269" r:id="rId21"/>
+    <p:sldId id="277" r:id="rId10"/>
+    <p:sldId id="278" r:id="rId11"/>
+    <p:sldId id="262" r:id="rId12"/>
+    <p:sldId id="265" r:id="rId13"/>
+    <p:sldId id="275" r:id="rId14"/>
+    <p:sldId id="274" r:id="rId15"/>
+    <p:sldId id="267" r:id="rId16"/>
+    <p:sldId id="271" r:id="rId17"/>
+    <p:sldId id="273" r:id="rId18"/>
+    <p:sldId id="272" r:id="rId19"/>
+    <p:sldId id="270" r:id="rId20"/>
+    <p:sldId id="268" r:id="rId21"/>
+    <p:sldId id="276" r:id="rId22"/>
+    <p:sldId id="269" r:id="rId23"/>
   </p:sldIdLst>
   <p:sldSz cx="9144000" cy="6858000" type="screen4x3"/>
   <p:notesSz cx="6858000" cy="9144000"/>
@@ -3475,6 +3477,306 @@
           <a:p>
             <a:r>
               <a:rPr lang="en-US" dirty="0" smtClean="0"/>
+              <a:t>NodeJS </a:t>
+            </a:r>
+            <a:r>
+              <a:rPr lang="en-US" dirty="0" smtClean="0"/>
+              <a:t>– Practical Issues</a:t>
+            </a:r>
+            <a:endParaRPr lang="en-US" dirty="0"/>
+          </a:p>
+        </p:txBody>
+      </p:sp>
+      <p:sp>
+        <p:nvSpPr>
+          <p:cNvPr id="3" name="Content Placeholder 2"/>
+          <p:cNvSpPr>
+            <a:spLocks noGrp="1"/>
+          </p:cNvSpPr>
+          <p:nvPr>
+            <p:ph idx="1"/>
+          </p:nvPr>
+        </p:nvSpPr>
+        <p:spPr/>
+        <p:txBody>
+          <a:bodyPr>
+            <a:normAutofit/>
+          </a:bodyPr>
+          <a:lstStyle/>
+          <a:p>
+            <a:r>
+              <a:rPr lang="en-GB" sz="1600" dirty="0" smtClean="0"/>
+              <a:t>Node </a:t>
+            </a:r>
+            <a:r>
+              <a:rPr lang="en-GB" sz="1600" dirty="0"/>
+              <a:t>will pause execution to run the garbage collector eventually/periodically. Your server will pause for a hiccup when this </a:t>
+            </a:r>
+            <a:r>
+              <a:rPr lang="en-GB" sz="1600" dirty="0" smtClean="0"/>
+              <a:t>happens</a:t>
+            </a:r>
+          </a:p>
+          <a:p>
+            <a:r>
+              <a:rPr lang="en-GB" sz="1600" dirty="0"/>
+              <a:t>Stack traces are often lost due to the event queue, so your logging and debugging methodology needs to change significantly</a:t>
+            </a:r>
+          </a:p>
+          <a:p>
+            <a:r>
+              <a:rPr lang="en-GB" sz="1600" dirty="0" smtClean="0"/>
+              <a:t>Forgetting </a:t>
+            </a:r>
+            <a:r>
+              <a:rPr lang="en-GB" sz="1600" dirty="0"/>
+              <a:t>to use </a:t>
+            </a:r>
+            <a:r>
+              <a:rPr lang="en-GB" sz="1600" dirty="0"/>
+              <a:t>return</a:t>
+            </a:r>
+            <a:r>
+              <a:rPr lang="en-GB" sz="1600" dirty="0"/>
+              <a:t> when you invoke the callback in a guard clause and don't want a function to continue to execute past that point</a:t>
+            </a:r>
+            <a:endParaRPr lang="en-GB" sz="1600" dirty="0" smtClean="0"/>
+          </a:p>
+          <a:p>
+            <a:pPr marL="0" indent="0">
+              <a:buNone/>
+            </a:pPr>
+            <a:endParaRPr lang="en-US" sz="1600" dirty="0"/>
+          </a:p>
+        </p:txBody>
+      </p:sp>
+    </p:spTree>
+    <p:extLst>
+      <p:ext uri="{BB962C8B-B14F-4D97-AF65-F5344CB8AC3E}">
+        <p14:creationId xmlns:p14="http://schemas.microsoft.com/office/powerpoint/2010/main" val="2909084920"/>
+      </p:ext>
+    </p:extLst>
+  </p:cSld>
+  <p:clrMapOvr>
+    <a:masterClrMapping/>
+  </p:clrMapOvr>
+  <p:timing>
+    <p:tnLst>
+      <p:par>
+        <p:cTn id="1" dur="indefinite" restart="never" nodeType="tmRoot"/>
+      </p:par>
+    </p:tnLst>
+  </p:timing>
+</p:sld>
+</file>
+
+<file path=ppt/slides/slide11.xml><?xml version="1.0" encoding="utf-8"?>
+<p:sld xmlns:a="http://schemas.openxmlformats.org/drawingml/2006/main" xmlns:r="http://schemas.openxmlformats.org/officeDocument/2006/relationships" xmlns:p="http://schemas.openxmlformats.org/presentationml/2006/main">
+  <p:cSld>
+    <p:spTree>
+      <p:nvGrpSpPr>
+        <p:cNvPr id="1" name=""/>
+        <p:cNvGrpSpPr/>
+        <p:nvPr/>
+      </p:nvGrpSpPr>
+      <p:grpSpPr>
+        <a:xfrm>
+          <a:off x="0" y="0"/>
+          <a:ext cx="0" cy="0"/>
+          <a:chOff x="0" y="0"/>
+          <a:chExt cx="0" cy="0"/>
+        </a:xfrm>
+      </p:grpSpPr>
+      <p:sp>
+        <p:nvSpPr>
+          <p:cNvPr id="2" name="Title 1"/>
+          <p:cNvSpPr>
+            <a:spLocks noGrp="1"/>
+          </p:cNvSpPr>
+          <p:nvPr>
+            <p:ph type="title"/>
+          </p:nvPr>
+        </p:nvSpPr>
+        <p:spPr/>
+        <p:txBody>
+          <a:bodyPr/>
+          <a:lstStyle/>
+          <a:p>
+            <a:r>
+              <a:rPr lang="en-US" dirty="0" smtClean="0"/>
+              <a:t>NodeJS REPL </a:t>
+            </a:r>
+            <a:endParaRPr lang="en-US" dirty="0"/>
+          </a:p>
+        </p:txBody>
+      </p:sp>
+      <p:sp>
+        <p:nvSpPr>
+          <p:cNvPr id="3" name="Content Placeholder 2"/>
+          <p:cNvSpPr>
+            <a:spLocks noGrp="1"/>
+          </p:cNvSpPr>
+          <p:nvPr>
+            <p:ph idx="1"/>
+          </p:nvPr>
+        </p:nvSpPr>
+        <p:spPr/>
+        <p:txBody>
+          <a:bodyPr/>
+          <a:lstStyle/>
+          <a:p>
+            <a:r>
+              <a:rPr lang="en-GB" dirty="0" smtClean="0"/>
+              <a:t>REPL – </a:t>
+            </a:r>
+            <a:r>
+              <a:rPr lang="en-GB" b="1" dirty="0" smtClean="0">
+                <a:solidFill>
+                  <a:srgbClr val="00B050"/>
+                </a:solidFill>
+              </a:rPr>
+              <a:t>Real Eval Print Loop</a:t>
+            </a:r>
+          </a:p>
+          <a:p>
+            <a:r>
+              <a:rPr lang="en-GB" dirty="0" smtClean="0"/>
+              <a:t>Represents a computer environment like a window console or Unix/Linux shell where a command is entered and system responds with an output in interactive mode</a:t>
+            </a:r>
+          </a:p>
+          <a:p>
+            <a:r>
+              <a:rPr lang="en-GB" b="1" dirty="0" smtClean="0">
+                <a:solidFill>
+                  <a:srgbClr val="00B050"/>
+                </a:solidFill>
+              </a:rPr>
+              <a:t>node</a:t>
+            </a:r>
+            <a:r>
+              <a:rPr lang="en-GB" dirty="0" smtClean="0"/>
+              <a:t> – to start the REPL</a:t>
+            </a:r>
+          </a:p>
+          <a:p>
+            <a:endParaRPr lang="en-GB" dirty="0" smtClean="0"/>
+          </a:p>
+          <a:p>
+            <a:endParaRPr lang="en-GB" dirty="0" smtClean="0"/>
+          </a:p>
+          <a:p>
+            <a:endParaRPr lang="en-US" dirty="0"/>
+          </a:p>
+        </p:txBody>
+      </p:sp>
+      <p:pic>
+        <p:nvPicPr>
+          <p:cNvPr id="3074" name="Picture 2"/>
+          <p:cNvPicPr>
+            <a:picLocks noChangeAspect="1" noChangeArrowheads="1"/>
+          </p:cNvPicPr>
+          <p:nvPr/>
+        </p:nvPicPr>
+        <p:blipFill>
+          <a:blip r:embed="rId2">
+            <a:extLst>
+              <a:ext uri="{28A0092B-C50C-407E-A947-70E740481C1C}">
+                <a14:useLocalDpi xmlns:a14="http://schemas.microsoft.com/office/drawing/2010/main" val="0"/>
+              </a:ext>
+            </a:extLst>
+          </a:blip>
+          <a:srcRect/>
+          <a:stretch>
+            <a:fillRect/>
+          </a:stretch>
+        </p:blipFill>
+        <p:spPr bwMode="auto">
+          <a:xfrm>
+            <a:off x="755576" y="3862388"/>
+            <a:ext cx="2105025" cy="866775"/>
+          </a:xfrm>
+          <a:prstGeom prst="rect">
+            <a:avLst/>
+          </a:prstGeom>
+          <a:noFill/>
+          <a:ln>
+            <a:noFill/>
+          </a:ln>
+          <a:extLst>
+            <a:ext uri="{909E8E84-426E-40DD-AFC4-6F175D3DCCD1}">
+              <a14:hiddenFill xmlns:a14="http://schemas.microsoft.com/office/drawing/2010/main">
+                <a:solidFill>
+                  <a:schemeClr val="accent1"/>
+                </a:solidFill>
+              </a14:hiddenFill>
+            </a:ext>
+            <a:ext uri="{91240B29-F687-4F45-9708-019B960494DF}">
+              <a14:hiddenLine xmlns:a14="http://schemas.microsoft.com/office/drawing/2010/main" w="9525">
+                <a:solidFill>
+                  <a:schemeClr val="tx1"/>
+                </a:solidFill>
+                <a:miter lim="800000"/>
+                <a:headEnd/>
+                <a:tailEnd/>
+              </a14:hiddenLine>
+            </a:ext>
+          </a:extLst>
+        </p:spPr>
+      </p:pic>
+    </p:spTree>
+    <p:extLst>
+      <p:ext uri="{BB962C8B-B14F-4D97-AF65-F5344CB8AC3E}">
+        <p14:creationId xmlns:p14="http://schemas.microsoft.com/office/powerpoint/2010/main" val="3516817522"/>
+      </p:ext>
+    </p:extLst>
+  </p:cSld>
+  <p:clrMapOvr>
+    <a:masterClrMapping/>
+  </p:clrMapOvr>
+  <p:timing>
+    <p:tnLst>
+      <p:par>
+        <p:cTn id="1" dur="indefinite" restart="never" nodeType="tmRoot"/>
+      </p:par>
+    </p:tnLst>
+  </p:timing>
+</p:sld>
+</file>
+
+<file path=ppt/slides/slide12.xml><?xml version="1.0" encoding="utf-8"?>
+<p:sld xmlns:a="http://schemas.openxmlformats.org/drawingml/2006/main" xmlns:r="http://schemas.openxmlformats.org/officeDocument/2006/relationships" xmlns:p="http://schemas.openxmlformats.org/presentationml/2006/main">
+  <p:cSld>
+    <p:spTree>
+      <p:nvGrpSpPr>
+        <p:cNvPr id="1" name=""/>
+        <p:cNvGrpSpPr/>
+        <p:nvPr/>
+      </p:nvGrpSpPr>
+      <p:grpSpPr>
+        <a:xfrm>
+          <a:off x="0" y="0"/>
+          <a:ext cx="0" cy="0"/>
+          <a:chOff x="0" y="0"/>
+          <a:chExt cx="0" cy="0"/>
+        </a:xfrm>
+      </p:grpSpPr>
+      <p:sp>
+        <p:nvSpPr>
+          <p:cNvPr id="2" name="Title 1"/>
+          <p:cNvSpPr>
+            <a:spLocks noGrp="1"/>
+          </p:cNvSpPr>
+          <p:nvPr>
+            <p:ph type="title"/>
+          </p:nvPr>
+        </p:nvSpPr>
+        <p:spPr/>
+        <p:txBody>
+          <a:bodyPr/>
+          <a:lstStyle/>
+          <a:p>
+            <a:r>
+              <a:rPr lang="en-US" dirty="0" smtClean="0"/>
               <a:t>Event Loop </a:t>
             </a:r>
             <a:endParaRPr lang="en-US" dirty="0"/>
@@ -3656,549 +3958,6 @@
 </p:sld>
 </file>
 
-<file path=ppt/slides/slide11.xml><?xml version="1.0" encoding="utf-8"?>
-<p:sld xmlns:a="http://schemas.openxmlformats.org/drawingml/2006/main" xmlns:r="http://schemas.openxmlformats.org/officeDocument/2006/relationships" xmlns:p="http://schemas.openxmlformats.org/presentationml/2006/main">
-  <p:cSld>
-    <p:spTree>
-      <p:nvGrpSpPr>
-        <p:cNvPr id="1" name=""/>
-        <p:cNvGrpSpPr/>
-        <p:nvPr/>
-      </p:nvGrpSpPr>
-      <p:grpSpPr>
-        <a:xfrm>
-          <a:off x="0" y="0"/>
-          <a:ext cx="0" cy="0"/>
-          <a:chOff x="0" y="0"/>
-          <a:chExt cx="0" cy="0"/>
-        </a:xfrm>
-      </p:grpSpPr>
-      <p:sp>
-        <p:nvSpPr>
-          <p:cNvPr id="2" name="Title 1"/>
-          <p:cNvSpPr>
-            <a:spLocks noGrp="1"/>
-          </p:cNvSpPr>
-          <p:nvPr>
-            <p:ph type="title"/>
-          </p:nvPr>
-        </p:nvSpPr>
-        <p:spPr/>
-        <p:txBody>
-          <a:bodyPr/>
-          <a:lstStyle/>
-          <a:p>
-            <a:r>
-              <a:rPr lang="en-US" dirty="0" smtClean="0"/>
-              <a:t>EventEmitter </a:t>
-            </a:r>
-            <a:endParaRPr lang="en-US" dirty="0"/>
-          </a:p>
-        </p:txBody>
-      </p:sp>
-      <p:sp>
-        <p:nvSpPr>
-          <p:cNvPr id="3" name="Content Placeholder 2"/>
-          <p:cNvSpPr>
-            <a:spLocks noGrp="1"/>
-          </p:cNvSpPr>
-          <p:nvPr>
-            <p:ph idx="1"/>
-          </p:nvPr>
-        </p:nvSpPr>
-        <p:spPr/>
-        <p:txBody>
-          <a:bodyPr>
-            <a:normAutofit lnSpcReduction="10000"/>
-          </a:bodyPr>
-          <a:lstStyle/>
-          <a:p>
-            <a:r>
-              <a:rPr lang="en-GB" sz="1400" dirty="0" smtClean="0"/>
-              <a:t>EventEmitter Class lies in </a:t>
-            </a:r>
-            <a:r>
-              <a:rPr lang="en-GB" sz="1400" b="1" dirty="0" smtClean="0">
-                <a:solidFill>
-                  <a:srgbClr val="00B050"/>
-                </a:solidFill>
-              </a:rPr>
-              <a:t>events</a:t>
-            </a:r>
-            <a:r>
-              <a:rPr lang="en-GB" sz="1400" dirty="0" smtClean="0"/>
-              <a:t> module</a:t>
-            </a:r>
-          </a:p>
-          <a:p>
-            <a:r>
-              <a:rPr lang="en-GB" sz="1400" dirty="0" smtClean="0"/>
-              <a:t>Many objects in Node emit events. Example:-</a:t>
-            </a:r>
-          </a:p>
-          <a:p>
-            <a:pPr lvl="1">
-              <a:buFont typeface="Wingdings" panose="05000000000000000000" pitchFamily="2" charset="2"/>
-              <a:buChar char="Ø"/>
-            </a:pPr>
-            <a:r>
-              <a:rPr lang="en-GB" sz="1400" dirty="0" smtClean="0"/>
-              <a:t>net.Server	- when peer connects to it</a:t>
-            </a:r>
-          </a:p>
-          <a:p>
-            <a:pPr lvl="1">
-              <a:buFont typeface="Wingdings" panose="05000000000000000000" pitchFamily="2" charset="2"/>
-              <a:buChar char="Ø"/>
-            </a:pPr>
-            <a:r>
-              <a:rPr lang="en-GB" sz="1400" dirty="0" smtClean="0"/>
-              <a:t>fs.readStream	- when the file is opened</a:t>
-            </a:r>
-          </a:p>
-          <a:p>
-            <a:r>
-              <a:rPr lang="en-GB" sz="1400" dirty="0" smtClean="0"/>
-              <a:t>Some methods:-</a:t>
-            </a:r>
-          </a:p>
-          <a:p>
-            <a:pPr lvl="1">
-              <a:buFont typeface="Wingdings" panose="05000000000000000000" pitchFamily="2" charset="2"/>
-              <a:buChar char="Ø"/>
-            </a:pPr>
-            <a:r>
-              <a:rPr lang="en-GB" sz="1400" dirty="0" err="1" smtClean="0"/>
-              <a:t>addListener</a:t>
-            </a:r>
-            <a:r>
-              <a:rPr lang="en-GB" sz="1400" dirty="0" smtClean="0"/>
-              <a:t>(event, listener)</a:t>
-            </a:r>
-          </a:p>
-          <a:p>
-            <a:pPr lvl="1">
-              <a:buFont typeface="Wingdings" panose="05000000000000000000" pitchFamily="2" charset="2"/>
-              <a:buChar char="Ø"/>
-            </a:pPr>
-            <a:r>
-              <a:rPr lang="en-GB" sz="1400" dirty="0" smtClean="0"/>
-              <a:t>on(event, listener)</a:t>
-            </a:r>
-          </a:p>
-          <a:p>
-            <a:pPr lvl="1">
-              <a:buFont typeface="Wingdings" panose="05000000000000000000" pitchFamily="2" charset="2"/>
-              <a:buChar char="Ø"/>
-            </a:pPr>
-            <a:r>
-              <a:rPr lang="en-GB" sz="1400" dirty="0" smtClean="0"/>
-              <a:t>once(</a:t>
-            </a:r>
-            <a:r>
-              <a:rPr lang="en-GB" sz="1400" dirty="0"/>
-              <a:t>event, listener</a:t>
-            </a:r>
-            <a:r>
-              <a:rPr lang="en-GB" sz="1400" dirty="0" smtClean="0"/>
-              <a:t>)</a:t>
-            </a:r>
-          </a:p>
-          <a:p>
-            <a:pPr lvl="1">
-              <a:buFont typeface="Wingdings" panose="05000000000000000000" pitchFamily="2" charset="2"/>
-              <a:buChar char="Ø"/>
-            </a:pPr>
-            <a:r>
-              <a:rPr lang="en-GB" sz="1400" dirty="0" err="1" smtClean="0"/>
-              <a:t>removeListener</a:t>
-            </a:r>
-            <a:r>
-              <a:rPr lang="en-GB" sz="1400" dirty="0" smtClean="0"/>
-              <a:t>(</a:t>
-            </a:r>
-            <a:r>
-              <a:rPr lang="en-GB" sz="1400" dirty="0"/>
-              <a:t>event, listener</a:t>
-            </a:r>
-            <a:r>
-              <a:rPr lang="en-GB" sz="1400" dirty="0" smtClean="0"/>
-              <a:t>)</a:t>
-            </a:r>
-          </a:p>
-          <a:p>
-            <a:pPr lvl="1">
-              <a:buFont typeface="Wingdings" panose="05000000000000000000" pitchFamily="2" charset="2"/>
-              <a:buChar char="Ø"/>
-            </a:pPr>
-            <a:r>
-              <a:rPr lang="en-GB" sz="1400" dirty="0" err="1" smtClean="0"/>
-              <a:t>removeAllListeners</a:t>
-            </a:r>
-            <a:r>
-              <a:rPr lang="en-GB" sz="1400" dirty="0" smtClean="0"/>
-              <a:t>([event])</a:t>
-            </a:r>
-          </a:p>
-          <a:p>
-            <a:pPr lvl="1">
-              <a:buFont typeface="Wingdings" panose="05000000000000000000" pitchFamily="2" charset="2"/>
-              <a:buChar char="Ø"/>
-            </a:pPr>
-            <a:r>
-              <a:rPr lang="en-GB" sz="1400" dirty="0" err="1" smtClean="0"/>
-              <a:t>setMaxListener</a:t>
-            </a:r>
-            <a:r>
-              <a:rPr lang="en-GB" sz="1400" dirty="0" smtClean="0"/>
-              <a:t>(n)</a:t>
-            </a:r>
-          </a:p>
-          <a:p>
-            <a:pPr lvl="1">
-              <a:buFont typeface="Wingdings" panose="05000000000000000000" pitchFamily="2" charset="2"/>
-              <a:buChar char="Ø"/>
-            </a:pPr>
-            <a:r>
-              <a:rPr lang="en-GB" sz="1400" dirty="0" smtClean="0"/>
-              <a:t>listeners(event)</a:t>
-            </a:r>
-          </a:p>
-          <a:p>
-            <a:pPr lvl="1">
-              <a:buFont typeface="Wingdings" panose="05000000000000000000" pitchFamily="2" charset="2"/>
-              <a:buChar char="Ø"/>
-            </a:pPr>
-            <a:r>
-              <a:rPr lang="en-GB" sz="1400" dirty="0" smtClean="0"/>
-              <a:t>emit(event, [arg1], [arg2], […])</a:t>
-            </a:r>
-          </a:p>
-          <a:p>
-            <a:r>
-              <a:rPr lang="en-GB" sz="1400" dirty="0" smtClean="0"/>
-              <a:t>Samples:-</a:t>
-            </a:r>
-          </a:p>
-          <a:p>
-            <a:pPr marL="274320" lvl="1" indent="0">
-              <a:buNone/>
-            </a:pPr>
-            <a:r>
-              <a:rPr lang="en-US" sz="1200" dirty="0" err="1"/>
-              <a:t>var</a:t>
-            </a:r>
-            <a:r>
-              <a:rPr lang="en-US" sz="1200" dirty="0"/>
-              <a:t> events = require('events'); </a:t>
-            </a:r>
-            <a:endParaRPr lang="en-US" sz="1200" dirty="0" smtClean="0"/>
-          </a:p>
-          <a:p>
-            <a:pPr marL="274320" lvl="1" indent="0">
-              <a:buNone/>
-            </a:pPr>
-            <a:r>
-              <a:rPr lang="en-US" sz="1200" dirty="0" err="1" smtClean="0"/>
-              <a:t>var</a:t>
-            </a:r>
-            <a:r>
-              <a:rPr lang="en-US" sz="1200" dirty="0" smtClean="0"/>
-              <a:t> </a:t>
-            </a:r>
-            <a:r>
-              <a:rPr lang="en-US" sz="1200" dirty="0" err="1"/>
-              <a:t>eventEmitter</a:t>
-            </a:r>
-            <a:r>
-              <a:rPr lang="en-US" sz="1200" dirty="0"/>
-              <a:t> = new </a:t>
-            </a:r>
-            <a:r>
-              <a:rPr lang="en-US" sz="1200" dirty="0" err="1"/>
-              <a:t>events.EventEmitter</a:t>
-            </a:r>
-            <a:r>
-              <a:rPr lang="en-US" sz="1200" dirty="0"/>
-              <a:t>(); </a:t>
-            </a:r>
-            <a:endParaRPr lang="en-US" sz="1200" dirty="0" smtClean="0"/>
-          </a:p>
-          <a:p>
-            <a:pPr marL="274320" lvl="1" indent="0">
-              <a:buNone/>
-            </a:pPr>
-            <a:r>
-              <a:rPr lang="en-US" sz="1200" dirty="0" err="1" smtClean="0"/>
-              <a:t>var</a:t>
-            </a:r>
-            <a:r>
-              <a:rPr lang="en-US" sz="1200" dirty="0" smtClean="0"/>
-              <a:t> </a:t>
-            </a:r>
-            <a:r>
-              <a:rPr lang="en-US" sz="1200" dirty="0"/>
-              <a:t>listner1 = function listner1() { console.log('listner1 executed.'); } </a:t>
-            </a:r>
-            <a:br>
-              <a:rPr lang="en-US" sz="1200" dirty="0"/>
-            </a:br>
-            <a:r>
-              <a:rPr lang="en-US" sz="1200" dirty="0" err="1" smtClean="0"/>
-              <a:t>var</a:t>
-            </a:r>
-            <a:r>
-              <a:rPr lang="en-US" sz="1200" dirty="0" smtClean="0"/>
-              <a:t> </a:t>
-            </a:r>
-            <a:r>
-              <a:rPr lang="en-US" sz="1200" dirty="0"/>
-              <a:t>listner2 = function listner2() { console.log('listner2 executed.'); } </a:t>
-            </a:r>
-            <a:endParaRPr lang="en-US" sz="1200" dirty="0" smtClean="0"/>
-          </a:p>
-          <a:p>
-            <a:pPr marL="274320" lvl="1" indent="0">
-              <a:buNone/>
-            </a:pPr>
-            <a:r>
-              <a:rPr lang="en-US" sz="1200" dirty="0" smtClean="0"/>
-              <a:t>function </a:t>
-            </a:r>
-            <a:r>
-              <a:rPr lang="en-US" sz="1200" dirty="0" err="1"/>
-              <a:t>eventEmitter.addListener</a:t>
-            </a:r>
-            <a:r>
-              <a:rPr lang="en-US" sz="1200" dirty="0"/>
-              <a:t>('connection', listner1); </a:t>
-            </a:r>
-            <a:endParaRPr lang="en-US" sz="1200" dirty="0" smtClean="0"/>
-          </a:p>
-          <a:p>
-            <a:pPr marL="274320" lvl="1" indent="0">
-              <a:buNone/>
-            </a:pPr>
-            <a:r>
-              <a:rPr lang="en-US" sz="1200" dirty="0" smtClean="0"/>
-              <a:t>function </a:t>
-            </a:r>
-            <a:r>
-              <a:rPr lang="en-US" sz="1200" dirty="0" err="1"/>
-              <a:t>eventEmitter.on</a:t>
-            </a:r>
-            <a:r>
-              <a:rPr lang="en-US" sz="1200" dirty="0"/>
-              <a:t>('connection', listner2); </a:t>
-            </a:r>
-            <a:endParaRPr lang="en-US" sz="1200" dirty="0" smtClean="0"/>
-          </a:p>
-          <a:p>
-            <a:pPr marL="274320" lvl="1" indent="0">
-              <a:buNone/>
-            </a:pPr>
-            <a:r>
-              <a:rPr lang="en-US" sz="1200" dirty="0" err="1"/>
-              <a:t>eventEmitter.emit</a:t>
-            </a:r>
-            <a:r>
-              <a:rPr lang="en-US" sz="1200" dirty="0"/>
-              <a:t>('connection');</a:t>
-            </a:r>
-            <a:r>
-              <a:rPr lang="en-US" sz="1000" dirty="0"/>
-              <a:t/>
-            </a:r>
-            <a:br>
-              <a:rPr lang="en-US" sz="1000" dirty="0"/>
-            </a:br>
-            <a:endParaRPr lang="en-GB" sz="1000" dirty="0"/>
-          </a:p>
-          <a:p>
-            <a:endParaRPr lang="en-US" sz="1400" dirty="0" smtClean="0"/>
-          </a:p>
-          <a:p>
-            <a:endParaRPr lang="en-US" dirty="0"/>
-          </a:p>
-        </p:txBody>
-      </p:sp>
-    </p:spTree>
-    <p:extLst>
-      <p:ext uri="{BB962C8B-B14F-4D97-AF65-F5344CB8AC3E}">
-        <p14:creationId xmlns:p14="http://schemas.microsoft.com/office/powerpoint/2010/main" val="2183630637"/>
-      </p:ext>
-    </p:extLst>
-  </p:cSld>
-  <p:clrMapOvr>
-    <a:masterClrMapping/>
-  </p:clrMapOvr>
-  <p:timing>
-    <p:tnLst>
-      <p:par>
-        <p:cTn id="1" dur="indefinite" restart="never" nodeType="tmRoot"/>
-      </p:par>
-    </p:tnLst>
-  </p:timing>
-</p:sld>
-</file>
-
-<file path=ppt/slides/slide12.xml><?xml version="1.0" encoding="utf-8"?>
-<p:sld xmlns:a="http://schemas.openxmlformats.org/drawingml/2006/main" xmlns:r="http://schemas.openxmlformats.org/officeDocument/2006/relationships" xmlns:p="http://schemas.openxmlformats.org/presentationml/2006/main">
-  <p:cSld>
-    <p:spTree>
-      <p:nvGrpSpPr>
-        <p:cNvPr id="1" name=""/>
-        <p:cNvGrpSpPr/>
-        <p:nvPr/>
-      </p:nvGrpSpPr>
-      <p:grpSpPr>
-        <a:xfrm>
-          <a:off x="0" y="0"/>
-          <a:ext cx="0" cy="0"/>
-          <a:chOff x="0" y="0"/>
-          <a:chExt cx="0" cy="0"/>
-        </a:xfrm>
-      </p:grpSpPr>
-      <p:sp>
-        <p:nvSpPr>
-          <p:cNvPr id="2" name="Title 1"/>
-          <p:cNvSpPr>
-            <a:spLocks noGrp="1"/>
-          </p:cNvSpPr>
-          <p:nvPr>
-            <p:ph type="title"/>
-          </p:nvPr>
-        </p:nvSpPr>
-        <p:spPr/>
-        <p:txBody>
-          <a:bodyPr/>
-          <a:lstStyle/>
-          <a:p>
-            <a:r>
-              <a:rPr lang="en-US" dirty="0" smtClean="0"/>
-              <a:t>File System Vs Stream API </a:t>
-            </a:r>
-            <a:endParaRPr lang="en-US" dirty="0"/>
-          </a:p>
-        </p:txBody>
-      </p:sp>
-      <p:sp>
-        <p:nvSpPr>
-          <p:cNvPr id="3" name="Content Placeholder 2"/>
-          <p:cNvSpPr>
-            <a:spLocks noGrp="1"/>
-          </p:cNvSpPr>
-          <p:nvPr>
-            <p:ph idx="1"/>
-          </p:nvPr>
-        </p:nvSpPr>
-        <p:spPr/>
-        <p:txBody>
-          <a:bodyPr/>
-          <a:lstStyle/>
-          <a:p>
-            <a:r>
-              <a:rPr lang="en-GB" dirty="0" smtClean="0"/>
-              <a:t>File System</a:t>
-            </a:r>
-          </a:p>
-          <a:p>
-            <a:pPr lvl="1"/>
-            <a:r>
-              <a:rPr lang="en-GB" dirty="0" smtClean="0"/>
-              <a:t>Wrappers around standard </a:t>
-            </a:r>
-            <a:r>
-              <a:rPr lang="en-GB" b="1" dirty="0" smtClean="0">
-                <a:solidFill>
-                  <a:srgbClr val="00B050"/>
-                </a:solidFill>
-              </a:rPr>
-              <a:t>POSIX </a:t>
-            </a:r>
-            <a:r>
-              <a:rPr lang="en-GB" dirty="0" smtClean="0">
-                <a:solidFill>
-                  <a:srgbClr val="00B050"/>
-                </a:solidFill>
-              </a:rPr>
-              <a:t>(Portable Operating System Interface) </a:t>
-            </a:r>
-            <a:r>
-              <a:rPr lang="en-GB" dirty="0" smtClean="0"/>
-              <a:t>functions</a:t>
-            </a:r>
-          </a:p>
-          <a:p>
-            <a:pPr lvl="1"/>
-            <a:r>
-              <a:rPr lang="en-GB" dirty="0" smtClean="0"/>
-              <a:t>Both asynchronous and synchronous versions are available</a:t>
-            </a:r>
-          </a:p>
-          <a:p>
-            <a:endParaRPr lang="en-US" dirty="0" smtClean="0"/>
-          </a:p>
-          <a:p>
-            <a:r>
-              <a:rPr lang="en-GB" dirty="0" smtClean="0"/>
-              <a:t>Stream</a:t>
-            </a:r>
-          </a:p>
-          <a:p>
-            <a:pPr lvl="1"/>
-            <a:r>
-              <a:rPr lang="en-GB" dirty="0" smtClean="0"/>
-              <a:t>Abstract interface implemented by various objects in NodeJS</a:t>
-            </a:r>
-          </a:p>
-          <a:p>
-            <a:pPr lvl="1"/>
-            <a:r>
-              <a:rPr lang="en-GB" dirty="0" smtClean="0"/>
-              <a:t>All streams are instances of “EventEmitter”</a:t>
-            </a:r>
-          </a:p>
-          <a:p>
-            <a:pPr lvl="1"/>
-            <a:r>
-              <a:rPr lang="en-GB" dirty="0" smtClean="0"/>
-              <a:t>Base stream classes provides are Readable, Writable, Duplex and Transform</a:t>
-            </a:r>
-          </a:p>
-          <a:p>
-            <a:pPr lvl="1"/>
-            <a:r>
-              <a:rPr lang="en-GB" dirty="0" smtClean="0"/>
-              <a:t>Pipe feature is available in Stream</a:t>
-            </a:r>
-            <a:endParaRPr lang="en-GB" dirty="0"/>
-          </a:p>
-          <a:p>
-            <a:endParaRPr lang="en-US" dirty="0"/>
-          </a:p>
-        </p:txBody>
-      </p:sp>
-    </p:spTree>
-    <p:extLst>
-      <p:ext uri="{BB962C8B-B14F-4D97-AF65-F5344CB8AC3E}">
-        <p14:creationId xmlns:p14="http://schemas.microsoft.com/office/powerpoint/2010/main" val="214781723"/>
-      </p:ext>
-    </p:extLst>
-  </p:cSld>
-  <p:clrMapOvr>
-    <a:masterClrMapping/>
-  </p:clrMapOvr>
-  <p:timing>
-    <p:tnLst>
-      <p:par>
-        <p:cTn id="1" dur="indefinite" restart="never" nodeType="tmRoot"/>
-      </p:par>
-    </p:tnLst>
-  </p:timing>
-</p:sld>
-</file>
-
 <file path=ppt/slides/slide13.xml><?xml version="1.0" encoding="utf-8"?>
 <p:sld xmlns:a="http://schemas.openxmlformats.org/drawingml/2006/main" xmlns:r="http://schemas.openxmlformats.org/officeDocument/2006/relationships" xmlns:p="http://schemas.openxmlformats.org/presentationml/2006/main">
   <p:cSld>
@@ -4233,7 +3992,7 @@
           <a:p>
             <a:r>
               <a:rPr lang="en-US" dirty="0" smtClean="0"/>
-              <a:t>Sync </a:t>
+              <a:t>EventEmitter </a:t>
             </a:r>
             <a:endParaRPr lang="en-US" dirty="0"/>
           </a:p>
@@ -4251,51 +4010,314 @@
         </p:nvSpPr>
         <p:spPr/>
         <p:txBody>
-          <a:bodyPr/>
-          <a:lstStyle/>
-          <a:p>
-            <a:r>
-              <a:rPr lang="en-US" dirty="0" smtClean="0"/>
-              <a:t>Library that makes simple to run asynchronous functions in synchronous manner, using node-fibers</a:t>
-            </a:r>
-          </a:p>
-          <a:p>
-            <a:r>
-              <a:rPr lang="en-US" dirty="0" smtClean="0"/>
-              <a:t>Uses JavaScript native design – Function.prototype.sync</a:t>
-            </a:r>
-          </a:p>
-          <a:p>
-            <a:r>
-              <a:rPr lang="en-US" dirty="0" smtClean="0"/>
-              <a:t>Doesn’t block the whole process. It blocks only current thread</a:t>
-            </a:r>
-          </a:p>
-          <a:p>
-            <a:r>
-              <a:rPr lang="en-US" dirty="0" smtClean="0"/>
-              <a:t>Use:-</a:t>
-            </a:r>
-          </a:p>
-          <a:p>
-            <a:pPr lvl="1"/>
-            <a:r>
-              <a:rPr lang="en-US" dirty="0" smtClean="0"/>
-              <a:t>Retrieve the child table record using parent table keys sequentially</a:t>
-            </a:r>
-          </a:p>
-          <a:p>
-            <a:r>
-              <a:rPr lang="en-US" dirty="0" smtClean="0"/>
-              <a:t>Link:-</a:t>
-            </a:r>
-          </a:p>
-          <a:p>
-            <a:pPr lvl="1"/>
-            <a:r>
-              <a:rPr lang="en-GB" dirty="0"/>
-              <a:t>https://www.npmjs.com/package/sync</a:t>
-            </a:r>
+          <a:bodyPr>
+            <a:normAutofit lnSpcReduction="10000"/>
+          </a:bodyPr>
+          <a:lstStyle/>
+          <a:p>
+            <a:r>
+              <a:rPr lang="en-GB" sz="1400" dirty="0" smtClean="0"/>
+              <a:t>EventEmitter Class lies in </a:t>
+            </a:r>
+            <a:r>
+              <a:rPr lang="en-GB" sz="1400" b="1" dirty="0" smtClean="0">
+                <a:solidFill>
+                  <a:srgbClr val="00B050"/>
+                </a:solidFill>
+              </a:rPr>
+              <a:t>events</a:t>
+            </a:r>
+            <a:r>
+              <a:rPr lang="en-GB" sz="1400" dirty="0" smtClean="0"/>
+              <a:t> module</a:t>
+            </a:r>
+          </a:p>
+          <a:p>
+            <a:r>
+              <a:rPr lang="en-GB" sz="1400" dirty="0" smtClean="0"/>
+              <a:t>Many objects in Node emit events. Example:-</a:t>
+            </a:r>
+          </a:p>
+          <a:p>
+            <a:pPr lvl="1">
+              <a:buFont typeface="Wingdings" panose="05000000000000000000" pitchFamily="2" charset="2"/>
+              <a:buChar char="Ø"/>
+            </a:pPr>
+            <a:r>
+              <a:rPr lang="en-GB" sz="1400" dirty="0" smtClean="0"/>
+              <a:t>net.Server	- when peer connects to it</a:t>
+            </a:r>
+          </a:p>
+          <a:p>
+            <a:pPr lvl="1">
+              <a:buFont typeface="Wingdings" panose="05000000000000000000" pitchFamily="2" charset="2"/>
+              <a:buChar char="Ø"/>
+            </a:pPr>
+            <a:r>
+              <a:rPr lang="en-GB" sz="1400" dirty="0" smtClean="0"/>
+              <a:t>fs.readStream	- when the file is opened</a:t>
+            </a:r>
+          </a:p>
+          <a:p>
+            <a:r>
+              <a:rPr lang="en-GB" sz="1400" dirty="0" smtClean="0"/>
+              <a:t>Some methods:-</a:t>
+            </a:r>
+          </a:p>
+          <a:p>
+            <a:pPr lvl="1">
+              <a:buFont typeface="Wingdings" panose="05000000000000000000" pitchFamily="2" charset="2"/>
+              <a:buChar char="Ø"/>
+            </a:pPr>
+            <a:r>
+              <a:rPr lang="en-GB" sz="1400" dirty="0" err="1" smtClean="0"/>
+              <a:t>addListener</a:t>
+            </a:r>
+            <a:r>
+              <a:rPr lang="en-GB" sz="1400" dirty="0" smtClean="0"/>
+              <a:t>(event, listener)</a:t>
+            </a:r>
+          </a:p>
+          <a:p>
+            <a:pPr lvl="1">
+              <a:buFont typeface="Wingdings" panose="05000000000000000000" pitchFamily="2" charset="2"/>
+              <a:buChar char="Ø"/>
+            </a:pPr>
+            <a:r>
+              <a:rPr lang="en-GB" sz="1400" dirty="0" smtClean="0"/>
+              <a:t>on(event, listener)</a:t>
+            </a:r>
+          </a:p>
+          <a:p>
+            <a:pPr lvl="1">
+              <a:buFont typeface="Wingdings" panose="05000000000000000000" pitchFamily="2" charset="2"/>
+              <a:buChar char="Ø"/>
+            </a:pPr>
+            <a:r>
+              <a:rPr lang="en-GB" sz="1400" dirty="0" smtClean="0"/>
+              <a:t>once(</a:t>
+            </a:r>
+            <a:r>
+              <a:rPr lang="en-GB" sz="1400" dirty="0"/>
+              <a:t>event, listener</a:t>
+            </a:r>
+            <a:r>
+              <a:rPr lang="en-GB" sz="1400" dirty="0" smtClean="0"/>
+              <a:t>)</a:t>
+            </a:r>
+          </a:p>
+          <a:p>
+            <a:pPr lvl="1">
+              <a:buFont typeface="Wingdings" panose="05000000000000000000" pitchFamily="2" charset="2"/>
+              <a:buChar char="Ø"/>
+            </a:pPr>
+            <a:r>
+              <a:rPr lang="en-GB" sz="1400" dirty="0" err="1" smtClean="0"/>
+              <a:t>removeListener</a:t>
+            </a:r>
+            <a:r>
+              <a:rPr lang="en-GB" sz="1400" dirty="0" smtClean="0"/>
+              <a:t>(</a:t>
+            </a:r>
+            <a:r>
+              <a:rPr lang="en-GB" sz="1400" dirty="0"/>
+              <a:t>event, listener</a:t>
+            </a:r>
+            <a:r>
+              <a:rPr lang="en-GB" sz="1400" dirty="0" smtClean="0"/>
+              <a:t>)</a:t>
+            </a:r>
+          </a:p>
+          <a:p>
+            <a:pPr lvl="1">
+              <a:buFont typeface="Wingdings" panose="05000000000000000000" pitchFamily="2" charset="2"/>
+              <a:buChar char="Ø"/>
+            </a:pPr>
+            <a:r>
+              <a:rPr lang="en-GB" sz="1400" dirty="0" err="1" smtClean="0"/>
+              <a:t>removeAllListeners</a:t>
+            </a:r>
+            <a:r>
+              <a:rPr lang="en-GB" sz="1400" dirty="0" smtClean="0"/>
+              <a:t>([event])</a:t>
+            </a:r>
+          </a:p>
+          <a:p>
+            <a:pPr lvl="1">
+              <a:buFont typeface="Wingdings" panose="05000000000000000000" pitchFamily="2" charset="2"/>
+              <a:buChar char="Ø"/>
+            </a:pPr>
+            <a:r>
+              <a:rPr lang="en-GB" sz="1400" dirty="0" err="1" smtClean="0"/>
+              <a:t>setMaxListener</a:t>
+            </a:r>
+            <a:r>
+              <a:rPr lang="en-GB" sz="1400" dirty="0" smtClean="0"/>
+              <a:t>(n)</a:t>
+            </a:r>
+          </a:p>
+          <a:p>
+            <a:pPr lvl="1">
+              <a:buFont typeface="Wingdings" panose="05000000000000000000" pitchFamily="2" charset="2"/>
+              <a:buChar char="Ø"/>
+            </a:pPr>
+            <a:r>
+              <a:rPr lang="en-GB" sz="1400" dirty="0" smtClean="0"/>
+              <a:t>listeners(event)</a:t>
+            </a:r>
+          </a:p>
+          <a:p>
+            <a:pPr lvl="1">
+              <a:buFont typeface="Wingdings" panose="05000000000000000000" pitchFamily="2" charset="2"/>
+              <a:buChar char="Ø"/>
+            </a:pPr>
+            <a:r>
+              <a:rPr lang="en-GB" sz="1400" dirty="0" smtClean="0"/>
+              <a:t>emit(event, [arg1], [arg2], […])</a:t>
+            </a:r>
+          </a:p>
+          <a:p>
+            <a:r>
+              <a:rPr lang="en-GB" sz="1400" dirty="0" smtClean="0"/>
+              <a:t>Samples:-</a:t>
+            </a:r>
+          </a:p>
+          <a:p>
+            <a:pPr marL="274320" lvl="1" indent="0">
+              <a:buNone/>
+            </a:pPr>
+            <a:r>
+              <a:rPr lang="en-US" sz="1200" dirty="0" err="1"/>
+              <a:t>var</a:t>
+            </a:r>
+            <a:r>
+              <a:rPr lang="en-US" sz="1200" dirty="0"/>
+              <a:t> events = require('events'); </a:t>
+            </a:r>
+            <a:endParaRPr lang="en-US" sz="1200" dirty="0" smtClean="0"/>
+          </a:p>
+          <a:p>
+            <a:pPr marL="274320" lvl="1" indent="0">
+              <a:buNone/>
+            </a:pPr>
+            <a:r>
+              <a:rPr lang="en-US" sz="1200" dirty="0" err="1" smtClean="0"/>
+              <a:t>var</a:t>
+            </a:r>
+            <a:r>
+              <a:rPr lang="en-US" sz="1200" dirty="0" smtClean="0"/>
+              <a:t> </a:t>
+            </a:r>
+            <a:r>
+              <a:rPr lang="en-US" sz="1200" dirty="0" err="1"/>
+              <a:t>eventEmitter</a:t>
+            </a:r>
+            <a:r>
+              <a:rPr lang="en-US" sz="1200" dirty="0"/>
+              <a:t> = new </a:t>
+            </a:r>
+            <a:r>
+              <a:rPr lang="en-US" sz="1200" dirty="0" err="1"/>
+              <a:t>events.EventEmitter</a:t>
+            </a:r>
+            <a:r>
+              <a:rPr lang="en-US" sz="1200" dirty="0"/>
+              <a:t>(); </a:t>
+            </a:r>
+            <a:endParaRPr lang="en-US" sz="1200" dirty="0" smtClean="0"/>
+          </a:p>
+          <a:p>
+            <a:pPr marL="274320" lvl="1" indent="0">
+              <a:buNone/>
+            </a:pPr>
+            <a:r>
+              <a:rPr lang="en-US" sz="1200" dirty="0" err="1" smtClean="0"/>
+              <a:t>var</a:t>
+            </a:r>
+            <a:r>
+              <a:rPr lang="en-US" sz="1200" dirty="0" smtClean="0"/>
+              <a:t> </a:t>
+            </a:r>
+            <a:r>
+              <a:rPr lang="en-US" sz="1200" dirty="0"/>
+              <a:t>listner1 = function listner1() { console.log('listner1 executed.'); } </a:t>
+            </a:r>
+            <a:br>
+              <a:rPr lang="en-US" sz="1200" dirty="0"/>
+            </a:br>
+            <a:r>
+              <a:rPr lang="en-US" sz="1200" dirty="0" err="1" smtClean="0"/>
+              <a:t>var</a:t>
+            </a:r>
+            <a:r>
+              <a:rPr lang="en-US" sz="1200" dirty="0" smtClean="0"/>
+              <a:t> </a:t>
+            </a:r>
+            <a:r>
+              <a:rPr lang="en-US" sz="1200" dirty="0"/>
+              <a:t>listner2 = function listner2() { console.log('listner2 executed.'); } </a:t>
+            </a:r>
+            <a:endParaRPr lang="en-US" sz="1200" dirty="0" smtClean="0"/>
+          </a:p>
+          <a:p>
+            <a:pPr marL="274320" lvl="1" indent="0">
+              <a:buNone/>
+            </a:pPr>
+            <a:r>
+              <a:rPr lang="en-US" sz="1200" dirty="0" smtClean="0"/>
+              <a:t>function </a:t>
+            </a:r>
+            <a:r>
+              <a:rPr lang="en-US" sz="1200" dirty="0" err="1"/>
+              <a:t>eventEmitter.addListener</a:t>
+            </a:r>
+            <a:r>
+              <a:rPr lang="en-US" sz="1200" dirty="0"/>
+              <a:t>('connection', listner1); </a:t>
+            </a:r>
+            <a:endParaRPr lang="en-US" sz="1200" dirty="0" smtClean="0"/>
+          </a:p>
+          <a:p>
+            <a:pPr marL="274320" lvl="1" indent="0">
+              <a:buNone/>
+            </a:pPr>
+            <a:r>
+              <a:rPr lang="en-US" sz="1200" dirty="0" smtClean="0"/>
+              <a:t>function </a:t>
+            </a:r>
+            <a:r>
+              <a:rPr lang="en-US" sz="1200" dirty="0" err="1"/>
+              <a:t>eventEmitter.on</a:t>
+            </a:r>
+            <a:r>
+              <a:rPr lang="en-US" sz="1200" dirty="0"/>
+              <a:t>('connection', listner2); </a:t>
+            </a:r>
+            <a:endParaRPr lang="en-US" sz="1200" dirty="0" smtClean="0"/>
+          </a:p>
+          <a:p>
+            <a:pPr marL="274320" lvl="1" indent="0">
+              <a:buNone/>
+            </a:pPr>
+            <a:r>
+              <a:rPr lang="en-US" sz="1200" dirty="0" err="1"/>
+              <a:t>eventEmitter.emit</a:t>
+            </a:r>
+            <a:r>
+              <a:rPr lang="en-US" sz="1200" dirty="0"/>
+              <a:t>('connection');</a:t>
+            </a:r>
+            <a:r>
+              <a:rPr lang="en-US" sz="1000" dirty="0"/>
+              <a:t/>
+            </a:r>
+            <a:br>
+              <a:rPr lang="en-US" sz="1000" dirty="0"/>
+            </a:br>
+            <a:endParaRPr lang="en-GB" sz="1000" dirty="0"/>
+          </a:p>
+          <a:p>
+            <a:endParaRPr lang="en-US" sz="1400" dirty="0" smtClean="0"/>
           </a:p>
           <a:p>
             <a:endParaRPr lang="en-US" dirty="0"/>
@@ -4305,7 +4327,7 @@
     </p:spTree>
     <p:extLst>
       <p:ext uri="{BB962C8B-B14F-4D97-AF65-F5344CB8AC3E}">
-        <p14:creationId xmlns:p14="http://schemas.microsoft.com/office/powerpoint/2010/main" val="3778497815"/>
+        <p14:creationId xmlns:p14="http://schemas.microsoft.com/office/powerpoint/2010/main" val="2183630637"/>
       </p:ext>
     </p:extLst>
   </p:cSld>
@@ -4356,7 +4378,7 @@
           <a:p>
             <a:r>
               <a:rPr lang="en-US" dirty="0" smtClean="0"/>
-              <a:t>Global Objects </a:t>
+              <a:t>File System Vs Stream API </a:t>
             </a:r>
             <a:endParaRPr lang="en-US" dirty="0"/>
           </a:p>
@@ -4374,211 +4396,95 @@
         </p:nvSpPr>
         <p:spPr/>
         <p:txBody>
-          <a:bodyPr>
-            <a:normAutofit/>
-          </a:bodyPr>
-          <a:lstStyle/>
-          <a:p>
-            <a:r>
-              <a:rPr lang="en-US" sz="1600" dirty="0" smtClean="0"/>
-              <a:t>NodeJS global objects are global in nature and they are available in all modules</a:t>
-            </a:r>
-          </a:p>
-          <a:p>
-            <a:r>
-              <a:rPr lang="en-US" sz="1600" dirty="0" smtClean="0"/>
-              <a:t>__filename, __dirname, setTimeout(</a:t>
-            </a:r>
-            <a:r>
-              <a:rPr lang="en-US" sz="1600" dirty="0" err="1" smtClean="0"/>
-              <a:t>cb</a:t>
-            </a:r>
-            <a:r>
-              <a:rPr lang="en-US" sz="1600" dirty="0" smtClean="0"/>
-              <a:t>, ms), clearTimeout(t), setInterval(</a:t>
-            </a:r>
-            <a:r>
-              <a:rPr lang="en-US" sz="1600" dirty="0" err="1" smtClean="0"/>
-              <a:t>cb</a:t>
-            </a:r>
-            <a:r>
-              <a:rPr lang="en-US" sz="1600" dirty="0" smtClean="0"/>
-              <a:t>, ms)</a:t>
-            </a:r>
-          </a:p>
-          <a:p>
-            <a:r>
-              <a:rPr lang="en-US" sz="1600" dirty="0" smtClean="0"/>
-              <a:t>It doesn’t need </a:t>
-            </a:r>
-            <a:r>
-              <a:rPr lang="en-US" sz="1600" b="1" dirty="0" smtClean="0">
+          <a:bodyPr/>
+          <a:lstStyle/>
+          <a:p>
+            <a:r>
+              <a:rPr lang="en-GB" dirty="0" smtClean="0"/>
+              <a:t>File System</a:t>
+            </a:r>
+          </a:p>
+          <a:p>
+            <a:pPr lvl="1"/>
+            <a:r>
+              <a:rPr lang="en-GB" dirty="0" smtClean="0"/>
+              <a:t>Wrappers around standard </a:t>
+            </a:r>
+            <a:r>
+              <a:rPr lang="en-GB" b="1" dirty="0" smtClean="0">
                 <a:solidFill>
                   <a:srgbClr val="00B050"/>
                 </a:solidFill>
               </a:rPr>
-              <a:t>“require()”</a:t>
-            </a:r>
-          </a:p>
-          <a:p>
-            <a:r>
-              <a:rPr lang="en-US" sz="1600" dirty="0" smtClean="0"/>
-              <a:t>NodeJS </a:t>
-            </a:r>
-            <a:r>
-              <a:rPr lang="en-US" sz="1600" b="1" dirty="0" smtClean="0">
+              <a:t>POSIX </a:t>
+            </a:r>
+            <a:r>
+              <a:rPr lang="en-GB" dirty="0" smtClean="0">
                 <a:solidFill>
                   <a:srgbClr val="00B050"/>
                 </a:solidFill>
               </a:rPr>
-              <a:t>console</a:t>
-            </a:r>
-            <a:r>
-              <a:rPr lang="en-US" sz="1600" b="1" dirty="0" smtClean="0"/>
-              <a:t> </a:t>
-            </a:r>
-            <a:r>
-              <a:rPr lang="en-US" sz="1600" dirty="0" smtClean="0"/>
-              <a:t>is a global object and is used to print different levels of messages to “</a:t>
-            </a:r>
-            <a:r>
-              <a:rPr lang="en-US" sz="1600" dirty="0" err="1" smtClean="0"/>
-              <a:t>stdout</a:t>
-            </a:r>
-            <a:r>
-              <a:rPr lang="en-US" sz="1600" dirty="0" smtClean="0"/>
-              <a:t>” and “</a:t>
-            </a:r>
-            <a:r>
-              <a:rPr lang="en-US" sz="1600" dirty="0" err="1" smtClean="0"/>
-              <a:t>stderr</a:t>
-            </a:r>
-            <a:r>
-              <a:rPr lang="en-US" sz="1600" dirty="0" smtClean="0"/>
-              <a:t>”</a:t>
-            </a:r>
-          </a:p>
-          <a:p>
-            <a:r>
-              <a:rPr lang="en-US" sz="1600" dirty="0" smtClean="0"/>
-              <a:t>NodeJS </a:t>
-            </a:r>
-            <a:r>
-              <a:rPr lang="en-US" sz="1600" b="1" dirty="0" smtClean="0">
-                <a:solidFill>
-                  <a:srgbClr val="00B050"/>
-                </a:solidFill>
-              </a:rPr>
-              <a:t>process</a:t>
-            </a:r>
-            <a:r>
-              <a:rPr lang="en-US" sz="1600" b="1" dirty="0" smtClean="0"/>
-              <a:t> </a:t>
-            </a:r>
-            <a:r>
-              <a:rPr lang="en-US" sz="1600" dirty="0" smtClean="0"/>
-              <a:t>is another global object, an instance of EventEmitter and emits the following events</a:t>
+              <a:t>(Portable Operating System Interface) </a:t>
+            </a:r>
+            <a:r>
+              <a:rPr lang="en-GB" dirty="0" smtClean="0"/>
+              <a:t>functions</a:t>
             </a:r>
           </a:p>
           <a:p>
             <a:pPr lvl="1"/>
             <a:r>
-              <a:rPr lang="en-US" sz="1600" dirty="0" smtClean="0"/>
-              <a:t>exit, </a:t>
-            </a:r>
-            <a:r>
-              <a:rPr lang="en-US" sz="1600" dirty="0" err="1" smtClean="0"/>
-              <a:t>beforeExit</a:t>
-            </a:r>
-            <a:r>
-              <a:rPr lang="en-US" sz="1600" dirty="0" smtClean="0"/>
-              <a:t>, </a:t>
-            </a:r>
-            <a:r>
-              <a:rPr lang="en-US" sz="1600" dirty="0" err="1" smtClean="0"/>
-              <a:t>uncaughtException</a:t>
-            </a:r>
-            <a:r>
-              <a:rPr lang="en-US" sz="1600" dirty="0" smtClean="0"/>
-              <a:t>, Signal Events</a:t>
-            </a:r>
-          </a:p>
-          <a:p>
-            <a:r>
-              <a:rPr lang="en-US" sz="1600" b="1" dirty="0" smtClean="0">
-                <a:solidFill>
-                  <a:srgbClr val="00B050"/>
-                </a:solidFill>
-              </a:rPr>
-              <a:t>Buffers</a:t>
-            </a:r>
-            <a:r>
-              <a:rPr lang="en-US" sz="1600" dirty="0" smtClean="0">
-                <a:solidFill>
-                  <a:srgbClr val="00B050"/>
-                </a:solidFill>
-              </a:rPr>
-              <a:t> </a:t>
-            </a:r>
-            <a:r>
-              <a:rPr lang="en-US" sz="1600" dirty="0" smtClean="0"/>
-              <a:t>– Global class to handle octet streams</a:t>
-            </a:r>
-          </a:p>
-          <a:p>
-            <a:r>
-              <a:rPr lang="en-US" sz="1600" b="1" dirty="0" smtClean="0">
-                <a:solidFill>
-                  <a:srgbClr val="00B050"/>
-                </a:solidFill>
-              </a:rPr>
-              <a:t>Timers</a:t>
-            </a:r>
-            <a:r>
-              <a:rPr lang="en-US" sz="1600" dirty="0" smtClean="0"/>
-              <a:t> – All timer functions are globals</a:t>
+              <a:rPr lang="en-GB" dirty="0" smtClean="0"/>
+              <a:t>Both asynchronous and synchronous versions are available</a:t>
+            </a:r>
+          </a:p>
+          <a:p>
+            <a:endParaRPr lang="en-US" dirty="0" smtClean="0"/>
+          </a:p>
+          <a:p>
+            <a:r>
+              <a:rPr lang="en-GB" dirty="0" smtClean="0"/>
+              <a:t>Stream</a:t>
             </a:r>
           </a:p>
           <a:p>
             <a:pPr lvl="1"/>
             <a:r>
-              <a:rPr lang="en-US" sz="1400" dirty="0" err="1" smtClean="0"/>
-              <a:t>clearImmediate</a:t>
-            </a:r>
-            <a:r>
-              <a:rPr lang="en-US" sz="1400" dirty="0" smtClean="0"/>
-              <a:t>(</a:t>
-            </a:r>
-            <a:r>
-              <a:rPr lang="en-US" sz="1400" dirty="0" err="1" smtClean="0"/>
-              <a:t>immediateObject</a:t>
-            </a:r>
-            <a:r>
-              <a:rPr lang="en-US" sz="1400" dirty="0" smtClean="0"/>
-              <a:t>), setInterval, setTimeout</a:t>
-            </a:r>
-            <a:endParaRPr lang="en-US" sz="1400" dirty="0"/>
-          </a:p>
-          <a:p>
-            <a:r>
-              <a:rPr lang="en-US" sz="1600" dirty="0" smtClean="0"/>
-              <a:t>Link:-</a:t>
+              <a:rPr lang="en-GB" dirty="0" smtClean="0"/>
+              <a:t>Abstract interface implemented by various objects in NodeJS</a:t>
             </a:r>
           </a:p>
           <a:p>
             <a:pPr lvl="1"/>
             <a:r>
-              <a:rPr lang="en-GB" sz="1600" dirty="0"/>
-              <a:t>http://www.tutorialspoint.com/nodejs/nodejs_process.htm</a:t>
-            </a:r>
-            <a:endParaRPr lang="en-US" sz="1600" dirty="0"/>
+              <a:rPr lang="en-GB" dirty="0" smtClean="0"/>
+              <a:t>All streams are instances of “EventEmitter”</a:t>
+            </a:r>
+          </a:p>
+          <a:p>
+            <a:pPr lvl="1"/>
+            <a:r>
+              <a:rPr lang="en-GB" dirty="0" smtClean="0"/>
+              <a:t>Base stream classes provides are Readable, Writable, Duplex and Transform</a:t>
+            </a:r>
+          </a:p>
+          <a:p>
+            <a:pPr lvl="1"/>
+            <a:r>
+              <a:rPr lang="en-GB" dirty="0" smtClean="0"/>
+              <a:t>Pipe feature is available in Stream</a:t>
+            </a:r>
+            <a:endParaRPr lang="en-GB" dirty="0"/>
+          </a:p>
+          <a:p>
+            <a:endParaRPr lang="en-US" dirty="0"/>
           </a:p>
         </p:txBody>
       </p:sp>
     </p:spTree>
     <p:extLst>
       <p:ext uri="{BB962C8B-B14F-4D97-AF65-F5344CB8AC3E}">
-        <p14:creationId xmlns:p14="http://schemas.microsoft.com/office/powerpoint/2010/main" val="1793465966"/>
+        <p14:creationId xmlns:p14="http://schemas.microsoft.com/office/powerpoint/2010/main" val="214781723"/>
       </p:ext>
     </p:extLst>
   </p:cSld>
@@ -4629,7 +4535,7 @@
           <a:p>
             <a:r>
               <a:rPr lang="en-US" dirty="0" smtClean="0"/>
-              <a:t>Utility Modules</a:t>
+              <a:t>Sync </a:t>
             </a:r>
             <a:endParaRPr lang="en-US" dirty="0"/>
           </a:p>
@@ -4647,66 +4553,69 @@
         </p:nvSpPr>
         <p:spPr/>
         <p:txBody>
-          <a:bodyPr>
-            <a:normAutofit/>
-          </a:bodyPr>
-          <a:lstStyle/>
-          <a:p>
-            <a:r>
-              <a:rPr lang="en-US" sz="1600" dirty="0" smtClean="0"/>
-              <a:t>OS Module – Basic OS related utility functions</a:t>
-            </a:r>
-          </a:p>
-          <a:p>
-            <a:r>
-              <a:rPr lang="en-US" sz="1600" dirty="0" smtClean="0"/>
-              <a:t>Path Module – Handling and transforming file paths</a:t>
-            </a:r>
-          </a:p>
-          <a:p>
-            <a:r>
-              <a:rPr lang="en-US" sz="1600" dirty="0" smtClean="0"/>
-              <a:t>Net Module – Provides both server and client as streams</a:t>
-            </a:r>
-            <a:endParaRPr lang="en-US" sz="1600" b="1" dirty="0" smtClean="0">
-              <a:solidFill>
-                <a:srgbClr val="00B050"/>
-              </a:solidFill>
-            </a:endParaRPr>
-          </a:p>
-          <a:p>
-            <a:r>
-              <a:rPr lang="en-US" sz="1600" dirty="0" smtClean="0"/>
-              <a:t>DNS Module – Provides functions to do DNS lookup </a:t>
-            </a:r>
-          </a:p>
-          <a:p>
-            <a:r>
-              <a:rPr lang="en-US" sz="1600" dirty="0" smtClean="0"/>
-              <a:t>Domain Module – Way to handle multiple different I/O operations as a single group</a:t>
-            </a:r>
-            <a:endParaRPr lang="en-US" sz="1400" dirty="0" smtClean="0"/>
-          </a:p>
-          <a:p>
-            <a:r>
-              <a:rPr lang="en-US" sz="1600" b="1" dirty="0" smtClean="0"/>
+          <a:bodyPr/>
+          <a:lstStyle/>
+          <a:p>
+            <a:r>
+              <a:rPr lang="en-US" dirty="0" smtClean="0"/>
+              <a:t>Library that makes simple to run asynchronous functions in synchronous manner, using </a:t>
+            </a:r>
+            <a:r>
+              <a:rPr lang="en-US" b="1" dirty="0" smtClean="0">
+                <a:solidFill>
+                  <a:srgbClr val="00B050"/>
+                </a:solidFill>
+              </a:rPr>
+              <a:t>node-fibers</a:t>
+            </a:r>
+          </a:p>
+          <a:p>
+            <a:r>
+              <a:rPr lang="en-US" dirty="0" smtClean="0"/>
+              <a:t>Uses JavaScript native design – Function.prototype.sync</a:t>
+            </a:r>
+          </a:p>
+          <a:p>
+            <a:r>
+              <a:rPr lang="en-US" dirty="0" smtClean="0"/>
+              <a:t>Doesn’t block the whole process. It blocks only current thread</a:t>
+            </a:r>
+          </a:p>
+          <a:p>
+            <a:r>
+              <a:rPr lang="en-US" dirty="0" smtClean="0"/>
+              <a:t>Use:-</a:t>
+            </a:r>
+          </a:p>
+          <a:p>
+            <a:pPr lvl="1"/>
+            <a:r>
+              <a:rPr lang="en-US" dirty="0" smtClean="0"/>
+              <a:t>Retrieve the child table record using parent table keys sequentially</a:t>
+            </a:r>
+          </a:p>
+          <a:p>
+            <a:r>
+              <a:rPr lang="en-US" dirty="0" smtClean="0"/>
               <a:t>Link:-</a:t>
             </a:r>
           </a:p>
           <a:p>
             <a:pPr lvl="1"/>
             <a:r>
-              <a:rPr lang="en-GB" sz="1600" dirty="0"/>
-              <a:t>http://www.tutorialspoint.com/nodejs/nodejs_utitlity_module.htm</a:t>
-            </a:r>
-            <a:endParaRPr lang="en-US" sz="1600" dirty="0"/>
+              <a:rPr lang="en-GB" dirty="0"/>
+              <a:t>https://www.npmjs.com/package/sync</a:t>
+            </a:r>
+          </a:p>
+          <a:p>
+            <a:endParaRPr lang="en-US" dirty="0"/>
           </a:p>
         </p:txBody>
       </p:sp>
     </p:spTree>
     <p:extLst>
       <p:ext uri="{BB962C8B-B14F-4D97-AF65-F5344CB8AC3E}">
-        <p14:creationId xmlns:p14="http://schemas.microsoft.com/office/powerpoint/2010/main" val="1662115043"/>
+        <p14:creationId xmlns:p14="http://schemas.microsoft.com/office/powerpoint/2010/main" val="3778497815"/>
       </p:ext>
     </p:extLst>
   </p:cSld>
@@ -4757,7 +4666,7 @@
           <a:p>
             <a:r>
               <a:rPr lang="en-US" dirty="0" smtClean="0"/>
-              <a:t>Express Framework </a:t>
+              <a:t>Global Objects </a:t>
             </a:r>
             <a:endParaRPr lang="en-US" dirty="0"/>
           </a:p>
@@ -4781,86 +4690,184 @@
           <a:lstStyle/>
           <a:p>
             <a:r>
-              <a:rPr lang="en-GB" sz="1600" dirty="0"/>
-              <a:t>Express is a minimal and flexible Node.js web application framework that provides a robust set of features to develop web and mobile </a:t>
-            </a:r>
-            <a:r>
-              <a:rPr lang="en-GB" sz="1600" dirty="0" smtClean="0"/>
-              <a:t>applications </a:t>
-            </a:r>
-          </a:p>
-          <a:p>
-            <a:r>
-              <a:rPr lang="en-GB" sz="1600" dirty="0" smtClean="0"/>
-              <a:t>Some features:-</a:t>
+              <a:rPr lang="en-US" sz="1600" dirty="0" smtClean="0"/>
+              <a:t>NodeJS global objects are global in nature and they are available in all modules</a:t>
+            </a:r>
+          </a:p>
+          <a:p>
+            <a:r>
+              <a:rPr lang="en-US" sz="1600" dirty="0" smtClean="0"/>
+              <a:t>__filename, __dirname, setTimeout(</a:t>
+            </a:r>
+            <a:r>
+              <a:rPr lang="en-US" sz="1600" dirty="0" err="1" smtClean="0"/>
+              <a:t>cb</a:t>
+            </a:r>
+            <a:r>
+              <a:rPr lang="en-US" sz="1600" dirty="0" smtClean="0"/>
+              <a:t>, ms), clearTimeout(t), setInterval(</a:t>
+            </a:r>
+            <a:r>
+              <a:rPr lang="en-US" sz="1600" dirty="0" err="1" smtClean="0"/>
+              <a:t>cb</a:t>
+            </a:r>
+            <a:r>
+              <a:rPr lang="en-US" sz="1600" dirty="0" smtClean="0"/>
+              <a:t>, ms)</a:t>
+            </a:r>
+          </a:p>
+          <a:p>
+            <a:r>
+              <a:rPr lang="en-US" sz="1600" dirty="0" smtClean="0"/>
+              <a:t>It doesn’t need </a:t>
+            </a:r>
+            <a:r>
+              <a:rPr lang="en-US" sz="1600" b="1" dirty="0" smtClean="0">
+                <a:solidFill>
+                  <a:srgbClr val="00B050"/>
+                </a:solidFill>
+              </a:rPr>
+              <a:t>“require()”</a:t>
+            </a:r>
+          </a:p>
+          <a:p>
+            <a:r>
+              <a:rPr lang="en-US" sz="1600" dirty="0" smtClean="0"/>
+              <a:t>NodeJS </a:t>
+            </a:r>
+            <a:r>
+              <a:rPr lang="en-US" sz="1600" b="1" dirty="0" smtClean="0">
+                <a:solidFill>
+                  <a:srgbClr val="00B050"/>
+                </a:solidFill>
+              </a:rPr>
+              <a:t>console</a:t>
+            </a:r>
+            <a:r>
+              <a:rPr lang="en-US" sz="1600" b="1" dirty="0" smtClean="0"/>
+              <a:t> </a:t>
+            </a:r>
+            <a:r>
+              <a:rPr lang="en-US" sz="1600" dirty="0" smtClean="0"/>
+              <a:t>is a global object and is used to print different levels of messages to “</a:t>
+            </a:r>
+            <a:r>
+              <a:rPr lang="en-US" sz="1600" dirty="0" err="1" smtClean="0"/>
+              <a:t>stdout</a:t>
+            </a:r>
+            <a:r>
+              <a:rPr lang="en-US" sz="1600" dirty="0" smtClean="0"/>
+              <a:t>” and “</a:t>
+            </a:r>
+            <a:r>
+              <a:rPr lang="en-US" sz="1600" dirty="0" err="1" smtClean="0"/>
+              <a:t>stderr</a:t>
+            </a:r>
+            <a:r>
+              <a:rPr lang="en-US" sz="1600" dirty="0" smtClean="0"/>
+              <a:t>”</a:t>
+            </a:r>
+          </a:p>
+          <a:p>
+            <a:r>
+              <a:rPr lang="en-US" sz="1600" dirty="0" smtClean="0"/>
+              <a:t>NodeJS </a:t>
+            </a:r>
+            <a:r>
+              <a:rPr lang="en-US" sz="1600" b="1" dirty="0" smtClean="0">
+                <a:solidFill>
+                  <a:srgbClr val="00B050"/>
+                </a:solidFill>
+              </a:rPr>
+              <a:t>process</a:t>
+            </a:r>
+            <a:r>
+              <a:rPr lang="en-US" sz="1600" b="1" dirty="0" smtClean="0"/>
+              <a:t> </a:t>
+            </a:r>
+            <a:r>
+              <a:rPr lang="en-US" sz="1600" dirty="0" smtClean="0"/>
+              <a:t>is another global object, an instance of EventEmitter and emits the following events</a:t>
             </a:r>
           </a:p>
           <a:p>
             <a:pPr lvl="1"/>
             <a:r>
-              <a:rPr lang="en-GB" sz="1400" dirty="0" smtClean="0"/>
-              <a:t>Respond to HTTP requests</a:t>
+              <a:rPr lang="en-US" sz="1600" dirty="0" smtClean="0"/>
+              <a:t>exit, </a:t>
+            </a:r>
+            <a:r>
+              <a:rPr lang="en-US" sz="1600" dirty="0" err="1" smtClean="0"/>
+              <a:t>beforeExit</a:t>
+            </a:r>
+            <a:r>
+              <a:rPr lang="en-US" sz="1600" dirty="0" smtClean="0"/>
+              <a:t>, </a:t>
+            </a:r>
+            <a:r>
+              <a:rPr lang="en-US" sz="1600" dirty="0" err="1" smtClean="0"/>
+              <a:t>uncaughtException</a:t>
+            </a:r>
+            <a:r>
+              <a:rPr lang="en-US" sz="1600" dirty="0" smtClean="0"/>
+              <a:t>, Signal Events</a:t>
+            </a:r>
+          </a:p>
+          <a:p>
+            <a:r>
+              <a:rPr lang="en-US" sz="1600" b="1" dirty="0" smtClean="0">
+                <a:solidFill>
+                  <a:srgbClr val="00B050"/>
+                </a:solidFill>
+              </a:rPr>
+              <a:t>Buffers</a:t>
+            </a:r>
+            <a:r>
+              <a:rPr lang="en-US" sz="1600" dirty="0" smtClean="0">
+                <a:solidFill>
+                  <a:srgbClr val="00B050"/>
+                </a:solidFill>
+              </a:rPr>
+              <a:t> </a:t>
+            </a:r>
+            <a:r>
+              <a:rPr lang="en-US" sz="1600" dirty="0" smtClean="0"/>
+              <a:t>– Global class to handle octet streams</a:t>
+            </a:r>
+          </a:p>
+          <a:p>
+            <a:r>
+              <a:rPr lang="en-US" sz="1600" b="1" dirty="0" smtClean="0">
+                <a:solidFill>
+                  <a:srgbClr val="00B050"/>
+                </a:solidFill>
+              </a:rPr>
+              <a:t>Timers</a:t>
+            </a:r>
+            <a:r>
+              <a:rPr lang="en-US" sz="1600" dirty="0" smtClean="0"/>
+              <a:t> – All timer functions are globals</a:t>
             </a:r>
           </a:p>
           <a:p>
             <a:pPr lvl="1"/>
             <a:r>
-              <a:rPr lang="en-GB" sz="1400" dirty="0" smtClean="0"/>
-              <a:t>Defines routing table to perform different action based on HTTP Method and URL</a:t>
-            </a:r>
-          </a:p>
-          <a:p>
-            <a:pPr lvl="1"/>
-            <a:r>
-              <a:rPr lang="en-GB" sz="1400" dirty="0" smtClean="0"/>
-              <a:t>Allows to dynamically render HTML pages based on passing arguments to templates</a:t>
-            </a:r>
-          </a:p>
-          <a:p>
-            <a:r>
-              <a:rPr lang="en-GB" sz="1600" dirty="0" smtClean="0"/>
-              <a:t>Important modules in Express:-</a:t>
-            </a:r>
-          </a:p>
-          <a:p>
-            <a:pPr lvl="1"/>
-            <a:r>
-              <a:rPr lang="en-GB" sz="1400" dirty="0" smtClean="0"/>
-              <a:t>body-parser	- Handling JSON, Raw, Text and URL encoded form data</a:t>
-            </a:r>
-          </a:p>
-          <a:p>
-            <a:pPr lvl="1"/>
-            <a:r>
-              <a:rPr lang="en-GB" sz="1400" dirty="0" smtClean="0"/>
-              <a:t>cookie-parser	- Parse cookie header and populate req.cookies</a:t>
-            </a:r>
-          </a:p>
-          <a:p>
-            <a:pPr lvl="1"/>
-            <a:r>
-              <a:rPr lang="en-GB" sz="1400" dirty="0"/>
-              <a:t>m</a:t>
-            </a:r>
-            <a:r>
-              <a:rPr lang="en-GB" sz="1400" dirty="0" smtClean="0"/>
-              <a:t>ulter	- To handle multipart/form-data</a:t>
-            </a:r>
-          </a:p>
-          <a:p>
-            <a:r>
-              <a:rPr lang="en-GB" sz="1600" dirty="0" smtClean="0"/>
-              <a:t>RESTful API calls:-</a:t>
-            </a:r>
-            <a:endParaRPr lang="en-GB" sz="1600" dirty="0"/>
-          </a:p>
-          <a:p>
-            <a:pPr lvl="1"/>
-            <a:r>
-              <a:rPr lang="en-GB" sz="1400" dirty="0" smtClean="0"/>
-              <a:t>Express framework is used for REST API</a:t>
-            </a:r>
-            <a:endParaRPr lang="en-GB" sz="1400" dirty="0"/>
+              <a:rPr lang="en-US" sz="1400" dirty="0" err="1" smtClean="0"/>
+              <a:t>clearImmediate</a:t>
+            </a:r>
+            <a:r>
+              <a:rPr lang="en-US" sz="1400" dirty="0" smtClean="0"/>
+              <a:t>(</a:t>
+            </a:r>
+            <a:r>
+              <a:rPr lang="en-US" sz="1400" dirty="0" err="1" smtClean="0"/>
+              <a:t>immediateObject</a:t>
+            </a:r>
+            <a:r>
+              <a:rPr lang="en-US" sz="1400" dirty="0" smtClean="0"/>
+              <a:t>), setInterval, setTimeout</a:t>
+            </a:r>
+            <a:endParaRPr lang="en-US" sz="1400" dirty="0"/>
           </a:p>
           <a:p>
             <a:r>
@@ -4872,7 +4879,7 @@
             <a:pPr lvl="1"/>
             <a:r>
               <a:rPr lang="en-GB" sz="1600" dirty="0"/>
-              <a:t>http://www.tutorialspoint.com/nodejs/nodejs_express_framework.htm</a:t>
+              <a:t>http://www.tutorialspoint.com/nodejs/nodejs_process.htm</a:t>
             </a:r>
             <a:endParaRPr lang="en-US" sz="1600" dirty="0"/>
           </a:p>
@@ -4881,7 +4888,7 @@
     </p:spTree>
     <p:extLst>
       <p:ext uri="{BB962C8B-B14F-4D97-AF65-F5344CB8AC3E}">
-        <p14:creationId xmlns:p14="http://schemas.microsoft.com/office/powerpoint/2010/main" val="2482651689"/>
+        <p14:creationId xmlns:p14="http://schemas.microsoft.com/office/powerpoint/2010/main" val="1793465966"/>
       </p:ext>
     </p:extLst>
   </p:cSld>
@@ -4932,7 +4939,7 @@
           <a:p>
             <a:r>
               <a:rPr lang="en-US" dirty="0" smtClean="0"/>
-              <a:t>Package and Module </a:t>
+              <a:t>Utility Modules</a:t>
             </a:r>
             <a:endParaRPr lang="en-US" dirty="0"/>
           </a:p>
@@ -4951,123 +4958,65 @@
         <p:spPr/>
         <p:txBody>
           <a:bodyPr>
-            <a:normAutofit lnSpcReduction="10000"/>
+            <a:normAutofit/>
           </a:bodyPr>
           <a:lstStyle/>
           <a:p>
             <a:r>
-              <a:rPr lang="en-US" dirty="0" smtClean="0"/>
-              <a:t>A Package is any of:</a:t>
+              <a:rPr lang="en-US" sz="1600" dirty="0" smtClean="0"/>
+              <a:t>OS Module – Basic OS related utility functions</a:t>
+            </a:r>
+          </a:p>
+          <a:p>
+            <a:r>
+              <a:rPr lang="en-US" sz="1600" dirty="0" smtClean="0"/>
+              <a:t>Path Module – Handling and transforming file paths</a:t>
+            </a:r>
+          </a:p>
+          <a:p>
+            <a:r>
+              <a:rPr lang="en-US" sz="1600" dirty="0" smtClean="0"/>
+              <a:t>Net Module – Provides both server and client as streams</a:t>
+            </a:r>
+            <a:endParaRPr lang="en-US" sz="1600" b="1" dirty="0" smtClean="0">
+              <a:solidFill>
+                <a:srgbClr val="00B050"/>
+              </a:solidFill>
+            </a:endParaRPr>
+          </a:p>
+          <a:p>
+            <a:r>
+              <a:rPr lang="en-US" sz="1600" dirty="0" smtClean="0"/>
+              <a:t>DNS Module – Provides functions to do DNS lookup </a:t>
+            </a:r>
+          </a:p>
+          <a:p>
+            <a:r>
+              <a:rPr lang="en-US" sz="1600" dirty="0" smtClean="0"/>
+              <a:t>Domain Module – Way to handle multiple different I/O operations as a single group</a:t>
+            </a:r>
+            <a:endParaRPr lang="en-US" sz="1400" dirty="0" smtClean="0"/>
+          </a:p>
+          <a:p>
+            <a:r>
+              <a:rPr lang="en-US" sz="1600" b="1" dirty="0" smtClean="0"/>
+              <a:t>Link:-</a:t>
             </a:r>
           </a:p>
           <a:p>
             <a:pPr lvl="1"/>
             <a:r>
-              <a:rPr lang="en-GB" dirty="0"/>
-              <a:t>a) a folder containing a program described by a </a:t>
-            </a:r>
-            <a:r>
-              <a:rPr lang="en-GB" b="1" dirty="0"/>
-              <a:t>package.json</a:t>
-            </a:r>
-            <a:r>
-              <a:rPr lang="en-GB" dirty="0"/>
-              <a:t> file</a:t>
-            </a:r>
-          </a:p>
-          <a:p>
-            <a:pPr lvl="1"/>
-            <a:r>
-              <a:rPr lang="en-GB" dirty="0"/>
-              <a:t>b) a gzipped tarball containing (a)</a:t>
-            </a:r>
-          </a:p>
-          <a:p>
-            <a:pPr lvl="1"/>
-            <a:r>
-              <a:rPr lang="en-GB" dirty="0"/>
-              <a:t>c) a url that resolves to (b)</a:t>
-            </a:r>
-          </a:p>
-          <a:p>
-            <a:pPr lvl="1"/>
-            <a:r>
-              <a:rPr lang="en-GB" dirty="0"/>
-              <a:t>d) a &lt;name&gt;@&lt;version&gt; that is published on the registry with (c)</a:t>
-            </a:r>
-          </a:p>
-          <a:p>
-            <a:pPr lvl="1"/>
-            <a:r>
-              <a:rPr lang="en-GB" dirty="0"/>
-              <a:t>e) a &lt;name&gt;@&lt;tag&gt; that points to (d)</a:t>
-            </a:r>
-          </a:p>
-          <a:p>
-            <a:pPr lvl="1"/>
-            <a:r>
-              <a:rPr lang="en-GB" dirty="0"/>
-              <a:t>f) a &lt;name&gt; that has a latest tag satisfying (e)</a:t>
-            </a:r>
-          </a:p>
-          <a:p>
-            <a:pPr lvl="1"/>
-            <a:r>
-              <a:rPr lang="en-GB" dirty="0"/>
-              <a:t>g) a git url that, when cloned, results in (a</a:t>
-            </a:r>
-            <a:r>
-              <a:rPr lang="en-GB" dirty="0" smtClean="0"/>
-              <a:t>)</a:t>
-            </a:r>
-            <a:endParaRPr lang="en-GB" dirty="0"/>
-          </a:p>
-          <a:p>
-            <a:r>
-              <a:rPr lang="en-US" dirty="0" smtClean="0"/>
-              <a:t>Module:</a:t>
-            </a:r>
-          </a:p>
-          <a:p>
-            <a:pPr lvl="1"/>
-            <a:r>
-              <a:rPr lang="en-GB" dirty="0"/>
-              <a:t>A module is anything that can be loaded with </a:t>
-            </a:r>
-            <a:r>
-              <a:rPr lang="en-GB" b="1" dirty="0"/>
-              <a:t>require() </a:t>
-            </a:r>
-            <a:r>
-              <a:rPr lang="en-GB" dirty="0"/>
-              <a:t>in a Node.js </a:t>
-            </a:r>
-            <a:r>
-              <a:rPr lang="en-GB" dirty="0" smtClean="0"/>
-              <a:t>program</a:t>
-            </a:r>
-            <a:endParaRPr lang="en-US" dirty="0" smtClean="0"/>
-          </a:p>
-          <a:p>
-            <a:r>
-              <a:rPr lang="en-US" dirty="0" smtClean="0"/>
-              <a:t>Link:-</a:t>
-            </a:r>
-          </a:p>
-          <a:p>
-            <a:pPr lvl="1"/>
-            <a:r>
-              <a:rPr lang="en-GB" dirty="0"/>
-              <a:t>https://docs.npmjs.com/how-npm-works/packages</a:t>
-            </a:r>
-            <a:endParaRPr lang="en-US" dirty="0"/>
+              <a:rPr lang="en-GB" sz="1600" dirty="0"/>
+              <a:t>http://www.tutorialspoint.com/nodejs/nodejs_utitlity_module.htm</a:t>
+            </a:r>
+            <a:endParaRPr lang="en-US" sz="1600" dirty="0"/>
           </a:p>
         </p:txBody>
       </p:sp>
     </p:spTree>
     <p:extLst>
       <p:ext uri="{BB962C8B-B14F-4D97-AF65-F5344CB8AC3E}">
-        <p14:creationId xmlns:p14="http://schemas.microsoft.com/office/powerpoint/2010/main" val="986545587"/>
+        <p14:creationId xmlns:p14="http://schemas.microsoft.com/office/powerpoint/2010/main" val="1662115043"/>
       </p:ext>
     </p:extLst>
   </p:cSld>
@@ -5118,7 +5067,7 @@
           <a:p>
             <a:r>
               <a:rPr lang="en-US" dirty="0" smtClean="0"/>
-              <a:t>npm-shrinkwrap</a:t>
+              <a:t>Express Framework </a:t>
             </a:r>
             <a:endParaRPr lang="en-US" dirty="0"/>
           </a:p>
@@ -5136,49 +5085,113 @@
         </p:nvSpPr>
         <p:spPr/>
         <p:txBody>
-          <a:bodyPr/>
-          <a:lstStyle/>
-          <a:p>
-            <a:r>
-              <a:rPr lang="en-US" dirty="0"/>
-              <a:t>n</a:t>
-            </a:r>
-            <a:r>
-              <a:rPr lang="en-US" dirty="0" smtClean="0"/>
-              <a:t>pm shrinkwrap</a:t>
-            </a:r>
-          </a:p>
-          <a:p>
-            <a:r>
-              <a:rPr lang="en-GB" dirty="0"/>
-              <a:t>This command locks down the versions of a package's dependencies so that you can control exactly which versions of each dependency will be used when your package is </a:t>
-            </a:r>
-            <a:r>
-              <a:rPr lang="en-GB" dirty="0" smtClean="0"/>
-              <a:t>installed</a:t>
-            </a:r>
-            <a:endParaRPr lang="en-US" dirty="0" smtClean="0"/>
-          </a:p>
-          <a:p>
-            <a:r>
-              <a:rPr lang="en-US" dirty="0" smtClean="0"/>
+          <a:bodyPr>
+            <a:normAutofit/>
+          </a:bodyPr>
+          <a:lstStyle/>
+          <a:p>
+            <a:r>
+              <a:rPr lang="en-GB" sz="1600" dirty="0"/>
+              <a:t>Express is a minimal and flexible Node.js web application framework that provides a robust set of features to develop web and mobile </a:t>
+            </a:r>
+            <a:r>
+              <a:rPr lang="en-GB" sz="1600" dirty="0" smtClean="0"/>
+              <a:t>applications </a:t>
+            </a:r>
+          </a:p>
+          <a:p>
+            <a:r>
+              <a:rPr lang="en-GB" sz="1600" dirty="0" smtClean="0"/>
+              <a:t>Some features:-</a:t>
+            </a:r>
+          </a:p>
+          <a:p>
+            <a:pPr lvl="1"/>
+            <a:r>
+              <a:rPr lang="en-GB" sz="1400" dirty="0" smtClean="0"/>
+              <a:t>Respond to HTTP requests</a:t>
+            </a:r>
+          </a:p>
+          <a:p>
+            <a:pPr lvl="1"/>
+            <a:r>
+              <a:rPr lang="en-GB" sz="1400" dirty="0" smtClean="0"/>
+              <a:t>Defines routing table to perform different action based on HTTP Method and URL</a:t>
+            </a:r>
+          </a:p>
+          <a:p>
+            <a:pPr lvl="1"/>
+            <a:r>
+              <a:rPr lang="en-GB" sz="1400" dirty="0" smtClean="0"/>
+              <a:t>Allows to dynamically render HTML pages based on passing arguments to templates</a:t>
+            </a:r>
+          </a:p>
+          <a:p>
+            <a:r>
+              <a:rPr lang="en-GB" sz="1600" dirty="0" smtClean="0"/>
+              <a:t>Important modules in Express:-</a:t>
+            </a:r>
+          </a:p>
+          <a:p>
+            <a:pPr lvl="1"/>
+            <a:r>
+              <a:rPr lang="en-GB" sz="1400" dirty="0" smtClean="0"/>
+              <a:t>body-parser	- Handling JSON, Raw, Text and URL encoded form data</a:t>
+            </a:r>
+          </a:p>
+          <a:p>
+            <a:pPr lvl="1"/>
+            <a:r>
+              <a:rPr lang="en-GB" sz="1400" dirty="0" smtClean="0"/>
+              <a:t>cookie-parser	- Parse cookie header and populate req.cookies</a:t>
+            </a:r>
+          </a:p>
+          <a:p>
+            <a:pPr lvl="1"/>
+            <a:r>
+              <a:rPr lang="en-GB" sz="1400" dirty="0"/>
+              <a:t>m</a:t>
+            </a:r>
+            <a:r>
+              <a:rPr lang="en-GB" sz="1400" dirty="0" smtClean="0"/>
+              <a:t>ulter	- To handle multipart/form-data</a:t>
+            </a:r>
+          </a:p>
+          <a:p>
+            <a:r>
+              <a:rPr lang="en-GB" sz="1600" dirty="0" smtClean="0"/>
+              <a:t>RESTful API calls:-</a:t>
+            </a:r>
+            <a:endParaRPr lang="en-GB" sz="1600" dirty="0"/>
+          </a:p>
+          <a:p>
+            <a:pPr lvl="1"/>
+            <a:r>
+              <a:rPr lang="en-GB" sz="1400" dirty="0" smtClean="0"/>
+              <a:t>Express framework is used for REST API</a:t>
+            </a:r>
+            <a:endParaRPr lang="en-GB" sz="1400" dirty="0"/>
+          </a:p>
+          <a:p>
+            <a:r>
+              <a:rPr lang="en-US" sz="1600" dirty="0" smtClean="0"/>
               <a:t>Link:-</a:t>
             </a:r>
           </a:p>
           <a:p>
             <a:pPr lvl="1"/>
             <a:r>
-              <a:rPr lang="en-GB" dirty="0"/>
-              <a:t>https://docs.npmjs.com/cli/shrinkwrap</a:t>
-            </a:r>
-            <a:endParaRPr lang="en-US" dirty="0"/>
+              <a:rPr lang="en-GB" sz="1600" dirty="0"/>
+              <a:t>http://www.tutorialspoint.com/nodejs/nodejs_express_framework.htm</a:t>
+            </a:r>
+            <a:endParaRPr lang="en-US" sz="1600" dirty="0"/>
           </a:p>
         </p:txBody>
       </p:sp>
     </p:spTree>
     <p:extLst>
       <p:ext uri="{BB962C8B-B14F-4D97-AF65-F5344CB8AC3E}">
-        <p14:creationId xmlns:p14="http://schemas.microsoft.com/office/powerpoint/2010/main" val="2003294085"/>
+        <p14:creationId xmlns:p14="http://schemas.microsoft.com/office/powerpoint/2010/main" val="2482651689"/>
       </p:ext>
     </p:extLst>
   </p:cSld>
@@ -5228,12 +5241,8 @@
           <a:lstStyle/>
           <a:p>
             <a:r>
-              <a:rPr lang="en-US" dirty="0"/>
-              <a:t>n</a:t>
-            </a:r>
-            <a:r>
               <a:rPr lang="en-US" dirty="0" smtClean="0"/>
-              <a:t>pm commands</a:t>
+              <a:t>Package and Module </a:t>
             </a:r>
             <a:endParaRPr lang="en-US" dirty="0"/>
           </a:p>
@@ -5252,83 +5261,131 @@
         <p:spPr/>
         <p:txBody>
           <a:bodyPr>
-            <a:normAutofit/>
+            <a:normAutofit lnSpcReduction="10000"/>
           </a:bodyPr>
           <a:lstStyle/>
           <a:p>
             <a:r>
-              <a:rPr lang="en-GB" sz="1600" dirty="0"/>
-              <a:t>Use npm-check-updates or npm outdated to suggest the latest </a:t>
-            </a:r>
-            <a:r>
-              <a:rPr lang="en-GB" sz="1600" dirty="0" smtClean="0"/>
-              <a:t>versions</a:t>
+              <a:rPr lang="en-US" dirty="0" smtClean="0"/>
+              <a:t>A Package is any of:</a:t>
             </a:r>
           </a:p>
           <a:p>
             <a:pPr lvl="1"/>
             <a:r>
-              <a:rPr lang="en-US" sz="1200" dirty="0"/>
-              <a:t>$ npm install -g npm-check-updates </a:t>
-            </a:r>
-            <a:endParaRPr lang="en-US" sz="1200" dirty="0" smtClean="0"/>
+              <a:rPr lang="en-GB" dirty="0"/>
+              <a:t>a) a folder containing a program described by a </a:t>
+            </a:r>
+            <a:r>
+              <a:rPr lang="en-GB" b="1" dirty="0"/>
+              <a:t>package.json</a:t>
+            </a:r>
+            <a:r>
+              <a:rPr lang="en-GB" dirty="0"/>
+              <a:t> file</a:t>
+            </a:r>
           </a:p>
           <a:p>
             <a:pPr lvl="1"/>
             <a:r>
-              <a:rPr lang="en-US" sz="1200" dirty="0" smtClean="0"/>
-              <a:t>$ npm-check-updates</a:t>
-            </a:r>
-          </a:p>
-          <a:p>
-            <a:r>
-              <a:rPr lang="en-GB" sz="1600" dirty="0"/>
-              <a:t>Update package.json with new versions if you agree</a:t>
+              <a:rPr lang="en-GB" dirty="0"/>
+              <a:t>b) a gzipped tarball containing (a)</a:t>
             </a:r>
           </a:p>
           <a:p>
             <a:pPr lvl="1"/>
             <a:r>
-              <a:rPr lang="en-US" sz="1200" dirty="0"/>
-              <a:t>npm-check-updates </a:t>
-            </a:r>
-            <a:r>
-              <a:rPr lang="en-US" sz="1200" dirty="0" smtClean="0"/>
-              <a:t>–u</a:t>
-            </a:r>
-          </a:p>
-          <a:p>
-            <a:r>
-              <a:rPr lang="en-GB" sz="1600" dirty="0"/>
-              <a:t>Then do a clean install (w/o the rm I got some dependency warnings)</a:t>
+              <a:rPr lang="en-GB" dirty="0"/>
+              <a:t>c) a url that resolves to (b)</a:t>
             </a:r>
           </a:p>
           <a:p>
             <a:pPr lvl="1"/>
             <a:r>
-              <a:rPr lang="en-US" sz="1200" dirty="0"/>
-              <a:t>$ rm -rf node_modules </a:t>
-            </a:r>
-            <a:endParaRPr lang="en-US" sz="1200" dirty="0" smtClean="0"/>
+              <a:rPr lang="en-GB" dirty="0"/>
+              <a:t>d) a &lt;name&gt;@&lt;version&gt; that is published on the registry with (c)</a:t>
+            </a:r>
           </a:p>
           <a:p>
             <a:pPr lvl="1"/>
             <a:r>
-              <a:rPr lang="en-US" sz="1200" dirty="0" smtClean="0"/>
-              <a:t>$ </a:t>
-            </a:r>
-            <a:r>
-              <a:rPr lang="en-US" sz="1200" dirty="0"/>
-              <a:t>npm install </a:t>
-            </a:r>
-            <a:endParaRPr lang="en-GB" sz="1200" dirty="0"/>
+              <a:rPr lang="en-GB" dirty="0"/>
+              <a:t>e) a &lt;name&gt;@&lt;tag&gt; that points to (d)</a:t>
+            </a:r>
+          </a:p>
+          <a:p>
+            <a:pPr lvl="1"/>
+            <a:r>
+              <a:rPr lang="en-GB" dirty="0"/>
+              <a:t>f) a &lt;name&gt; that has a latest tag satisfying (e)</a:t>
+            </a:r>
+          </a:p>
+          <a:p>
+            <a:pPr lvl="1"/>
+            <a:r>
+              <a:rPr lang="en-GB" dirty="0"/>
+              <a:t>g) a git url that, when cloned, results in (a</a:t>
+            </a:r>
+            <a:r>
+              <a:rPr lang="en-GB" dirty="0" smtClean="0"/>
+              <a:t>)</a:t>
+            </a:r>
+            <a:endParaRPr lang="en-GB" dirty="0"/>
+          </a:p>
+          <a:p>
+            <a:r>
+              <a:rPr lang="en-US" dirty="0" smtClean="0"/>
+              <a:t>Module:</a:t>
+            </a:r>
+          </a:p>
+          <a:p>
+            <a:pPr lvl="1"/>
+            <a:r>
+              <a:rPr lang="en-GB" dirty="0"/>
+              <a:t>A module is anything that can be loaded with </a:t>
+            </a:r>
+            <a:r>
+              <a:rPr lang="en-GB" b="1" dirty="0">
+                <a:solidFill>
+                  <a:srgbClr val="00B050"/>
+                </a:solidFill>
+              </a:rPr>
+              <a:t>require()</a:t>
+            </a:r>
+            <a:r>
+              <a:rPr lang="en-GB" b="1" dirty="0"/>
+              <a:t> </a:t>
+            </a:r>
+            <a:r>
+              <a:rPr lang="en-GB" dirty="0"/>
+              <a:t>in a Node.js </a:t>
+            </a:r>
+            <a:r>
+              <a:rPr lang="en-GB" dirty="0" smtClean="0"/>
+              <a:t>program</a:t>
+            </a:r>
+            <a:endParaRPr lang="en-US" dirty="0" smtClean="0"/>
+          </a:p>
+          <a:p>
+            <a:r>
+              <a:rPr lang="en-US" dirty="0" smtClean="0"/>
+              <a:t>Link:-</a:t>
+            </a:r>
+          </a:p>
+          <a:p>
+            <a:pPr lvl="1"/>
+            <a:r>
+              <a:rPr lang="en-GB" dirty="0"/>
+              <a:t>https://docs.npmjs.com/how-npm-works/packages</a:t>
+            </a:r>
+            <a:endParaRPr lang="en-US" dirty="0"/>
           </a:p>
         </p:txBody>
       </p:sp>
     </p:spTree>
     <p:extLst>
       <p:ext uri="{BB962C8B-B14F-4D97-AF65-F5344CB8AC3E}">
-        <p14:creationId xmlns:p14="http://schemas.microsoft.com/office/powerpoint/2010/main" val="1103897029"/>
+        <p14:creationId xmlns:p14="http://schemas.microsoft.com/office/powerpoint/2010/main" val="986545587"/>
       </p:ext>
     </p:extLst>
   </p:cSld>
@@ -5496,6 +5553,267 @@
           <a:p>
             <a:r>
               <a:rPr lang="en-US" dirty="0" smtClean="0"/>
+              <a:t>npm-shrinkwrap</a:t>
+            </a:r>
+            <a:endParaRPr lang="en-US" dirty="0"/>
+          </a:p>
+        </p:txBody>
+      </p:sp>
+      <p:sp>
+        <p:nvSpPr>
+          <p:cNvPr id="3" name="Content Placeholder 2"/>
+          <p:cNvSpPr>
+            <a:spLocks noGrp="1"/>
+          </p:cNvSpPr>
+          <p:nvPr>
+            <p:ph idx="1"/>
+          </p:nvPr>
+        </p:nvSpPr>
+        <p:spPr/>
+        <p:txBody>
+          <a:bodyPr/>
+          <a:lstStyle/>
+          <a:p>
+            <a:r>
+              <a:rPr lang="en-US" dirty="0"/>
+              <a:t>n</a:t>
+            </a:r>
+            <a:r>
+              <a:rPr lang="en-US" dirty="0" smtClean="0"/>
+              <a:t>pm shrinkwrap</a:t>
+            </a:r>
+          </a:p>
+          <a:p>
+            <a:r>
+              <a:rPr lang="en-GB" dirty="0"/>
+              <a:t>This command locks down the versions of a package's dependencies so that you can control exactly which versions of each dependency will be used when your package is </a:t>
+            </a:r>
+            <a:r>
+              <a:rPr lang="en-GB" dirty="0" smtClean="0"/>
+              <a:t>installed</a:t>
+            </a:r>
+            <a:endParaRPr lang="en-US" dirty="0" smtClean="0"/>
+          </a:p>
+          <a:p>
+            <a:r>
+              <a:rPr lang="en-US" dirty="0" smtClean="0"/>
+              <a:t>Link:-</a:t>
+            </a:r>
+          </a:p>
+          <a:p>
+            <a:pPr lvl="1"/>
+            <a:r>
+              <a:rPr lang="en-GB" dirty="0"/>
+              <a:t>https://docs.npmjs.com/cli/shrinkwrap</a:t>
+            </a:r>
+            <a:endParaRPr lang="en-US" dirty="0"/>
+          </a:p>
+        </p:txBody>
+      </p:sp>
+    </p:spTree>
+    <p:extLst>
+      <p:ext uri="{BB962C8B-B14F-4D97-AF65-F5344CB8AC3E}">
+        <p14:creationId xmlns:p14="http://schemas.microsoft.com/office/powerpoint/2010/main" val="2003294085"/>
+      </p:ext>
+    </p:extLst>
+  </p:cSld>
+  <p:clrMapOvr>
+    <a:masterClrMapping/>
+  </p:clrMapOvr>
+  <p:timing>
+    <p:tnLst>
+      <p:par>
+        <p:cTn id="1" dur="indefinite" restart="never" nodeType="tmRoot"/>
+      </p:par>
+    </p:tnLst>
+  </p:timing>
+</p:sld>
+</file>
+
+<file path=ppt/slides/slide21.xml><?xml version="1.0" encoding="utf-8"?>
+<p:sld xmlns:a="http://schemas.openxmlformats.org/drawingml/2006/main" xmlns:r="http://schemas.openxmlformats.org/officeDocument/2006/relationships" xmlns:p="http://schemas.openxmlformats.org/presentationml/2006/main">
+  <p:cSld>
+    <p:spTree>
+      <p:nvGrpSpPr>
+        <p:cNvPr id="1" name=""/>
+        <p:cNvGrpSpPr/>
+        <p:nvPr/>
+      </p:nvGrpSpPr>
+      <p:grpSpPr>
+        <a:xfrm>
+          <a:off x="0" y="0"/>
+          <a:ext cx="0" cy="0"/>
+          <a:chOff x="0" y="0"/>
+          <a:chExt cx="0" cy="0"/>
+        </a:xfrm>
+      </p:grpSpPr>
+      <p:sp>
+        <p:nvSpPr>
+          <p:cNvPr id="2" name="Title 1"/>
+          <p:cNvSpPr>
+            <a:spLocks noGrp="1"/>
+          </p:cNvSpPr>
+          <p:nvPr>
+            <p:ph type="title"/>
+          </p:nvPr>
+        </p:nvSpPr>
+        <p:spPr/>
+        <p:txBody>
+          <a:bodyPr/>
+          <a:lstStyle/>
+          <a:p>
+            <a:r>
+              <a:rPr lang="en-US" dirty="0"/>
+              <a:t>n</a:t>
+            </a:r>
+            <a:r>
+              <a:rPr lang="en-US" dirty="0" smtClean="0"/>
+              <a:t>pm commands</a:t>
+            </a:r>
+            <a:endParaRPr lang="en-US" dirty="0"/>
+          </a:p>
+        </p:txBody>
+      </p:sp>
+      <p:sp>
+        <p:nvSpPr>
+          <p:cNvPr id="3" name="Content Placeholder 2"/>
+          <p:cNvSpPr>
+            <a:spLocks noGrp="1"/>
+          </p:cNvSpPr>
+          <p:nvPr>
+            <p:ph idx="1"/>
+          </p:nvPr>
+        </p:nvSpPr>
+        <p:spPr/>
+        <p:txBody>
+          <a:bodyPr>
+            <a:normAutofit/>
+          </a:bodyPr>
+          <a:lstStyle/>
+          <a:p>
+            <a:r>
+              <a:rPr lang="en-GB" sz="1600" dirty="0"/>
+              <a:t>Use npm-check-updates or npm outdated to suggest the latest </a:t>
+            </a:r>
+            <a:r>
+              <a:rPr lang="en-GB" sz="1600" dirty="0" smtClean="0"/>
+              <a:t>versions</a:t>
+            </a:r>
+          </a:p>
+          <a:p>
+            <a:pPr lvl="1"/>
+            <a:r>
+              <a:rPr lang="en-US" sz="1200" dirty="0"/>
+              <a:t>$ npm install -g npm-check-updates </a:t>
+            </a:r>
+            <a:endParaRPr lang="en-US" sz="1200" dirty="0" smtClean="0"/>
+          </a:p>
+          <a:p>
+            <a:pPr lvl="1"/>
+            <a:r>
+              <a:rPr lang="en-US" sz="1200" dirty="0" smtClean="0"/>
+              <a:t>$ npm-check-updates</a:t>
+            </a:r>
+          </a:p>
+          <a:p>
+            <a:r>
+              <a:rPr lang="en-GB" sz="1600" dirty="0"/>
+              <a:t>Update package.json with new versions if you agree</a:t>
+            </a:r>
+          </a:p>
+          <a:p>
+            <a:pPr lvl="1"/>
+            <a:r>
+              <a:rPr lang="en-US" sz="1200" dirty="0"/>
+              <a:t>npm-check-updates </a:t>
+            </a:r>
+            <a:r>
+              <a:rPr lang="en-US" sz="1200" dirty="0" smtClean="0"/>
+              <a:t>–u</a:t>
+            </a:r>
+          </a:p>
+          <a:p>
+            <a:r>
+              <a:rPr lang="en-GB" sz="1600" dirty="0"/>
+              <a:t>Then do a clean install (w/o the rm I got some dependency warnings)</a:t>
+            </a:r>
+          </a:p>
+          <a:p>
+            <a:pPr lvl="1"/>
+            <a:r>
+              <a:rPr lang="en-US" sz="1200" dirty="0"/>
+              <a:t>$ rm -rf node_modules </a:t>
+            </a:r>
+            <a:endParaRPr lang="en-US" sz="1200" dirty="0" smtClean="0"/>
+          </a:p>
+          <a:p>
+            <a:pPr lvl="1"/>
+            <a:r>
+              <a:rPr lang="en-US" sz="1200" dirty="0" smtClean="0"/>
+              <a:t>$ </a:t>
+            </a:r>
+            <a:r>
+              <a:rPr lang="en-US" sz="1200" dirty="0"/>
+              <a:t>npm install </a:t>
+            </a:r>
+            <a:endParaRPr lang="en-GB" sz="1200" dirty="0"/>
+          </a:p>
+        </p:txBody>
+      </p:sp>
+    </p:spTree>
+    <p:extLst>
+      <p:ext uri="{BB962C8B-B14F-4D97-AF65-F5344CB8AC3E}">
+        <p14:creationId xmlns:p14="http://schemas.microsoft.com/office/powerpoint/2010/main" val="1103897029"/>
+      </p:ext>
+    </p:extLst>
+  </p:cSld>
+  <p:clrMapOvr>
+    <a:masterClrMapping/>
+  </p:clrMapOvr>
+  <p:timing>
+    <p:tnLst>
+      <p:par>
+        <p:cTn id="1" dur="indefinite" restart="never" nodeType="tmRoot"/>
+      </p:par>
+    </p:tnLst>
+  </p:timing>
+</p:sld>
+</file>
+
+<file path=ppt/slides/slide22.xml><?xml version="1.0" encoding="utf-8"?>
+<p:sld xmlns:a="http://schemas.openxmlformats.org/drawingml/2006/main" xmlns:r="http://schemas.openxmlformats.org/officeDocument/2006/relationships" xmlns:p="http://schemas.openxmlformats.org/presentationml/2006/main">
+  <p:cSld>
+    <p:spTree>
+      <p:nvGrpSpPr>
+        <p:cNvPr id="1" name=""/>
+        <p:cNvGrpSpPr/>
+        <p:nvPr/>
+      </p:nvGrpSpPr>
+      <p:grpSpPr>
+        <a:xfrm>
+          <a:off x="0" y="0"/>
+          <a:ext cx="0" cy="0"/>
+          <a:chOff x="0" y="0"/>
+          <a:chExt cx="0" cy="0"/>
+        </a:xfrm>
+      </p:grpSpPr>
+      <p:sp>
+        <p:nvSpPr>
+          <p:cNvPr id="2" name="Title 1"/>
+          <p:cNvSpPr>
+            <a:spLocks noGrp="1"/>
+          </p:cNvSpPr>
+          <p:nvPr>
+            <p:ph type="title"/>
+          </p:nvPr>
+        </p:nvSpPr>
+        <p:spPr/>
+        <p:txBody>
+          <a:bodyPr/>
+          <a:lstStyle/>
+          <a:p>
+            <a:r>
+              <a:rPr lang="en-US" dirty="0" smtClean="0"/>
               <a:t>References</a:t>
             </a:r>
             <a:endParaRPr lang="en-US" dirty="0"/>
@@ -5563,8 +5881,23 @@
           </a:p>
           <a:p>
             <a:r>
+              <a:rPr lang="en-US" dirty="0">
+                <a:hlinkClick r:id="rId5"/>
+              </a:rPr>
+              <a:t>https://</a:t>
+            </a:r>
+            <a:r>
+              <a:rPr lang="en-US" dirty="0" smtClean="0">
+                <a:hlinkClick r:id="rId5"/>
+              </a:rPr>
+              <a:t>en.wikipedia.org/wiki/POSIX</a:t>
+            </a:r>
+            <a:endParaRPr lang="en-US" dirty="0" smtClean="0"/>
+          </a:p>
+          <a:p>
+            <a:r>
               <a:rPr lang="en-US" dirty="0"/>
-              <a:t>https://en.wikipedia.org/wiki/POSIX</a:t>
+              <a:t>https://www.quora.com/What-are-the-disadvantages-of-using-Node-js</a:t>
             </a:r>
             <a:endParaRPr lang="en-US" dirty="0" smtClean="0"/>
           </a:p>
@@ -6237,7 +6570,11 @@
           <a:p>
             <a:r>
               <a:rPr lang="en-US" dirty="0" smtClean="0"/>
-              <a:t>NodeJS REPL </a:t>
+              <a:t>NodeJS </a:t>
+            </a:r>
+            <a:r>
+              <a:rPr lang="en-US" dirty="0" smtClean="0"/>
+              <a:t>Disadvantages</a:t>
             </a:r>
             <a:endParaRPr lang="en-US" dirty="0"/>
           </a:p>
@@ -6255,111 +6592,48 @@
         </p:nvSpPr>
         <p:spPr/>
         <p:txBody>
-          <a:bodyPr/>
-          <a:lstStyle/>
-          <a:p>
-            <a:r>
-              <a:rPr lang="en-GB" dirty="0" smtClean="0"/>
-              <a:t>REPL – </a:t>
-            </a:r>
-            <a:r>
-              <a:rPr lang="en-GB" b="1" dirty="0" smtClean="0">
-                <a:solidFill>
-                  <a:srgbClr val="00B050"/>
-                </a:solidFill>
-              </a:rPr>
-              <a:t>Real Eval Print Loop</a:t>
-            </a:r>
-          </a:p>
-          <a:p>
-            <a:r>
-              <a:rPr lang="en-GB" dirty="0" smtClean="0"/>
-              <a:t>Represents a computer environment like a window console or Unix/Linux shell where a command is entered and system responds with an output in interactive mode</a:t>
-            </a:r>
-          </a:p>
-          <a:p>
-            <a:r>
-              <a:rPr lang="en-GB" b="1" dirty="0" smtClean="0">
-                <a:solidFill>
-                  <a:srgbClr val="00B050"/>
-                </a:solidFill>
-              </a:rPr>
-              <a:t>node</a:t>
-            </a:r>
-            <a:r>
-              <a:rPr lang="en-GB" dirty="0" smtClean="0"/>
-              <a:t> – to start the REPL</a:t>
-            </a:r>
-          </a:p>
-          <a:p>
-            <a:endParaRPr lang="en-GB" dirty="0" smtClean="0"/>
-          </a:p>
-          <a:p>
-            <a:endParaRPr lang="en-GB" dirty="0" smtClean="0"/>
-          </a:p>
-          <a:p>
-            <a:endParaRPr lang="en-US" dirty="0"/>
-          </a:p>
-        </p:txBody>
-      </p:sp>
-      <p:pic>
-        <p:nvPicPr>
-          <p:cNvPr id="3074" name="Picture 2"/>
-          <p:cNvPicPr>
-            <a:picLocks noChangeAspect="1" noChangeArrowheads="1"/>
-          </p:cNvPicPr>
-          <p:nvPr/>
-        </p:nvPicPr>
-        <p:blipFill>
-          <a:blip r:embed="rId2">
-            <a:extLst>
-              <a:ext uri="{28A0092B-C50C-407E-A947-70E740481C1C}">
-                <a14:useLocalDpi xmlns:a14="http://schemas.microsoft.com/office/drawing/2010/main" val="0"/>
-              </a:ext>
-            </a:extLst>
-          </a:blip>
-          <a:srcRect/>
-          <a:stretch>
-            <a:fillRect/>
-          </a:stretch>
-        </p:blipFill>
-        <p:spPr bwMode="auto">
-          <a:xfrm>
-            <a:off x="755576" y="3862388"/>
-            <a:ext cx="2105025" cy="866775"/>
-          </a:xfrm>
-          <a:prstGeom prst="rect">
-            <a:avLst/>
-          </a:prstGeom>
-          <a:noFill/>
-          <a:ln>
-            <a:noFill/>
-          </a:ln>
-          <a:extLst>
-            <a:ext uri="{909E8E84-426E-40DD-AFC4-6F175D3DCCD1}">
-              <a14:hiddenFill xmlns:a14="http://schemas.microsoft.com/office/drawing/2010/main">
-                <a:solidFill>
-                  <a:schemeClr val="accent1"/>
-                </a:solidFill>
-              </a14:hiddenFill>
-            </a:ext>
-            <a:ext uri="{91240B29-F687-4F45-9708-019B960494DF}">
-              <a14:hiddenLine xmlns:a14="http://schemas.microsoft.com/office/drawing/2010/main" w="9525">
-                <a:solidFill>
-                  <a:schemeClr val="tx1"/>
-                </a:solidFill>
-                <a:miter lim="800000"/>
-                <a:headEnd/>
-                <a:tailEnd/>
-              </a14:hiddenLine>
-            </a:ext>
-          </a:extLst>
-        </p:spPr>
-      </p:pic>
+          <a:bodyPr>
+            <a:normAutofit/>
+          </a:bodyPr>
+          <a:lstStyle/>
+          <a:p>
+            <a:r>
+              <a:rPr lang="en-GB" sz="1600" dirty="0" smtClean="0"/>
+              <a:t>Bad concurrency primitives</a:t>
+            </a:r>
+          </a:p>
+          <a:p>
+            <a:r>
+              <a:rPr lang="en-GB" sz="1600" dirty="0" smtClean="0"/>
+              <a:t>Single Threaded</a:t>
+            </a:r>
+          </a:p>
+          <a:p>
+            <a:r>
+              <a:rPr lang="en-GB" sz="1600" dirty="0" smtClean="0"/>
+              <a:t>Reliance on stringly</a:t>
+            </a:r>
+            <a:r>
+              <a:rPr lang="en-GB" sz="1600" dirty="0"/>
+              <a:t>-</a:t>
+            </a:r>
+            <a:r>
+              <a:rPr lang="en-GB" sz="1600" dirty="0" smtClean="0"/>
+              <a:t>typed programming</a:t>
+            </a:r>
+          </a:p>
+          <a:p>
+            <a:r>
+              <a:rPr lang="en-GB" sz="1600" dirty="0" smtClean="0"/>
+              <a:t>Hard to make things fault tolerant (though alleviated some what by the introduction of domain)</a:t>
+            </a:r>
+          </a:p>
+        </p:txBody>
+      </p:sp>
     </p:spTree>
     <p:extLst>
       <p:ext uri="{BB962C8B-B14F-4D97-AF65-F5344CB8AC3E}">
-        <p14:creationId xmlns:p14="http://schemas.microsoft.com/office/powerpoint/2010/main" val="3516817522"/>
+        <p14:creationId xmlns:p14="http://schemas.microsoft.com/office/powerpoint/2010/main" val="411215519"/>
       </p:ext>
     </p:extLst>
   </p:cSld>

</xml_diff>